<commit_message>
added logging to db
</commit_message>
<xml_diff>
--- a/Architecture-data-v2.pptx
+++ b/Architecture-data-v2.pptx
@@ -246,7 +246,7 @@
   </p:defaultTextStyle>
   <p:extLst>
     <p:ext uri="http://customooxmlschemas.google.com/">
-      <go:slidesCustomData xmlns:go="http://customooxmlschemas.google.com/" r:id="rId9" roundtripDataSignature="AMtx7mi17zOoCE5BRANHbEXfMmlChKiN2A=="/>
+      <go:slidesCustomData xmlns:go="http://customooxmlschemas.google.com/" r:id="rId9" roundtripDataSignature="AMtx7mj/usMcDqmxAbk5PG6YQD6uBwsUcw=="/>
     </p:ext>
   </p:extLst>
 </p:presentation>
@@ -16481,9 +16481,64 @@
           <a:chExt cx="0" cy="0"/>
         </a:xfrm>
       </p:grpSpPr>
+      <p:pic>
+        <p:nvPicPr>
+          <p:cNvPr id="185" name="Google Shape;185;g95f015ef34_0_0"/>
+          <p:cNvPicPr preferRelativeResize="0"/>
+          <p:nvPr/>
+        </p:nvPicPr>
+        <p:blipFill rotWithShape="1">
+          <a:blip r:embed="rId3">
+            <a:alphaModFix/>
+          </a:blip>
+          <a:srcRect b="34432" l="0" r="0" t="35403"/>
+          <a:stretch/>
+        </p:blipFill>
+        <p:spPr>
+          <a:xfrm>
+            <a:off x="7400379" y="4135249"/>
+            <a:ext cx="785725" cy="237000"/>
+          </a:xfrm>
+          <a:prstGeom prst="rect">
+            <a:avLst/>
+          </a:prstGeom>
+          <a:noFill/>
+          <a:ln>
+            <a:noFill/>
+          </a:ln>
+        </p:spPr>
+      </p:pic>
+      <p:pic>
+        <p:nvPicPr>
+          <p:cNvPr id="186" name="Google Shape;186;g95f015ef34_0_0"/>
+          <p:cNvPicPr preferRelativeResize="0"/>
+          <p:nvPr/>
+        </p:nvPicPr>
+        <p:blipFill>
+          <a:blip r:embed="rId4">
+            <a:alphaModFix/>
+          </a:blip>
+          <a:stretch>
+            <a:fillRect/>
+          </a:stretch>
+        </p:blipFill>
+        <p:spPr>
+          <a:xfrm>
+            <a:off x="7319375" y="1954250"/>
+            <a:ext cx="612850" cy="612850"/>
+          </a:xfrm>
+          <a:prstGeom prst="rect">
+            <a:avLst/>
+          </a:prstGeom>
+          <a:noFill/>
+          <a:ln>
+            <a:noFill/>
+          </a:ln>
+        </p:spPr>
+      </p:pic>
       <p:sp>
         <p:nvSpPr>
-          <p:cNvPr id="185" name="Google Shape;185;g95f015ef34_0_0"/>
+          <p:cNvPr id="187" name="Google Shape;187;g95f015ef34_0_0"/>
           <p:cNvSpPr/>
           <p:nvPr/>
         </p:nvSpPr>
@@ -16542,12 +16597,12 @@
       </p:sp>
       <p:pic>
         <p:nvPicPr>
-          <p:cNvPr id="186" name="Google Shape;186;g95f015ef34_0_0"/>
+          <p:cNvPr id="188" name="Google Shape;188;g95f015ef34_0_0"/>
           <p:cNvPicPr preferRelativeResize="0"/>
           <p:nvPr/>
         </p:nvPicPr>
         <p:blipFill rotWithShape="1">
-          <a:blip r:embed="rId3">
+          <a:blip r:embed="rId5">
             <a:alphaModFix/>
           </a:blip>
           <a:srcRect b="0" l="0" r="0" t="0"/>
@@ -16569,14 +16624,14 @@
       </p:pic>
       <p:sp>
         <p:nvSpPr>
-          <p:cNvPr id="187" name="Google Shape;187;g95f015ef34_0_0"/>
+          <p:cNvPr id="189" name="Google Shape;189;g95f015ef34_0_0"/>
           <p:cNvSpPr/>
           <p:nvPr/>
         </p:nvSpPr>
         <p:spPr>
           <a:xfrm>
-            <a:off x="9462525" y="1346875"/>
-            <a:ext cx="2218800" cy="1435500"/>
+            <a:off x="9630250" y="1346875"/>
+            <a:ext cx="2051100" cy="1827600"/>
           </a:xfrm>
           <a:prstGeom prst="rect">
             <a:avLst/>
@@ -16628,7 +16683,7 @@
       </p:sp>
       <p:sp>
         <p:nvSpPr>
-          <p:cNvPr id="188" name="Google Shape;188;g95f015ef34_0_0"/>
+          <p:cNvPr id="190" name="Google Shape;190;g95f015ef34_0_0"/>
           <p:cNvSpPr/>
           <p:nvPr/>
         </p:nvSpPr>
@@ -16687,7 +16742,7 @@
       </p:sp>
       <p:sp>
         <p:nvSpPr>
-          <p:cNvPr descr="Image result for python programming" id="189" name="Google Shape;189;g95f015ef34_0_0"/>
+          <p:cNvPr descr="Image result for python programming" id="191" name="Google Shape;191;g95f015ef34_0_0"/>
           <p:cNvSpPr/>
           <p:nvPr/>
         </p:nvSpPr>
@@ -16736,7 +16791,7 @@
       </p:sp>
       <p:sp>
         <p:nvSpPr>
-          <p:cNvPr descr="data:image/jpeg;base64,/9j/4AAQSkZJRgABAQAAAQABAAD/2wCEAAkGBxMSEBUSExAVFRUVFRUVFxYVFRUVFRUQFRUXGBUWFRYYHSggGB0lHRUVITEhJSkrLi4uGB8zODMtNygtLisBCgoKDg0OGhAQGi0fHyUtLS0tLS0tLS0tLS0tLS0tLS0tLS0tLS0tLS0tLS0tLS0tLS0tLS0tLS0tLS0tLS0tLf/AABEIAIsBbAMBEQACEQEDEQH/xAAcAAABBQEBAQAAAAAAAAAAAAAAAQIEBgcDBQj/xABIEAABAwICBQcIBggGAgMAAAABAAIDBBEFIQYSMUFRBxNhcYGRoRQiMkJSYrHBI3JzkrLRJDNTgpOiwuEVJWOj0vCDszRDRP/EABoBAQACAwEAAAAAAAAAAAAAAAABBAIDBQb/xAA1EQEAAgIABAMHAgUDBQAAAAAAAQIDEQQSITEFQVETIjJhcYGRM6EUQrHB8CNS0RU0kuHx/9oADAMBAAIRAxEAPwDcUAgEAgEAgEAgEAgEAgiVeIxR+m8Do2nuCDyKjSpg9BhPSclOh5tRpg4bebZ1kfNNDiNLpDsew9QCDvFpbJvDD4FNCfT6VtPpxkdIN/BND2KPE4pfQeL8Dke4qNCYgEAgEAgEAgEAgEAgEAgEAgEAgEAgEAgEAgEAgEAgEAgEAgEAgEAgEAgi11eyFus91uA3nqCCnY5pYQ0kvETL2GfnOJ3DeT0BSPPosOqqjzgzmGH15gTIRxbCCCP3iOpNpe3TaKwjOV0kx99xa3+HHZvfdQh6lLh8MQtHDGz6rGt+AQStY8UDJYw4Wc0OHSAfiggzYLA7/wCvVPFhLfAZeCDzarR97c4363Q7zXdh2HwU7BQ47NC7UkBIHquycB0FToWugr2TNux1+I3jrCxEpAIBAIBAIBAIBAIBAIBAIBAIBAIBAIBAIBAIBAIBAIBAIBAIBAIPNxnFWwN4vPot+Z6EGdYliss04hhbz1S4XsTaOJntyu9RvAbTuUzOuzOtdxueyyaP6Ksp3CaV3P1Nv1rhYMvtbCzZGN2WZ3lY6RNt9IWBSxCBHuAFyQBxJsO8oRG+zzZ9IqRhs6rhB+0afgVjN6x5t9eFzW7Un8GR6T0R2VkP3wPio9pX1TPCZ4/kn8PQp6uN4uyRjh7rg74FZRMT2arY7V7xMOylg5VNKyQar23HiOo7kFeqqKSmdzkbiW8d46HDh0qRZcFxds7bbHjaOPSE0PUUAQCAQCAQCAQCAQJdAXQKgEAgEAgEAgEAgEAgEAgEAgEAgEAgEGeVem9UK6WmZDCWRvILzr3DBbM2Nr5rRGS035Yh1Z4PDThozXtO5jt07q5phpI6PYdaeW+qDsa0eu4cBuG9br3ikKXD4LZrah5eieJTRujijk1edlYZXgDnJXF9rveczlkBsC1VtMrmbBSu49G0FbnLIgz7SrlHbG4w0YbI4ZOldnG08GD1z07OtV75/KrscL4XNo58vSPTzZ5iOJzVBvNM+Q+8ch1N2DsCr2tM93Yx4ceONUiIRAsW3YQPhlLDrMcWni0lp7wpRaInv1WnA9PamEgSO55nvemB0Hf29620yzChn8PxZO3SWnYFj8NUwOjdnvG8Hhbj0K1W8W7OFxHDXwzqz1SN3/bLJXVrEqN1O8Sxkht/unh1LLY8XHuUWrp5QzmYSx4ux5D7m1tYHztoJ8RxVXLltS2tOzwPh+DicfNzTuO8dHnO5UKw7GQD9x//ADWv+Isux4Ng9Zc3cpld/oj/AMZ/5KP4i7L/AKRw/wA/yWLlNrQcxC7rjcPg5Iz3RPg/D+W4+72sM5Vhe1RTWHtRO1v5HW+K2V4j1hVy+CzH6dt/Xp+6+YPjMFUzXglDxv3OaeDmnNp61vraLRuHHzYMmG3LeNPQWTUEESuxBkQ8457gNp/IKJtEd23FhtknVVFxvlLawlsLA8jffzAfrb+wdqr3z67Oxg8H5o3klVqjlDr3bJWs6Gxt/qutXtryv18K4aO8b+7i3TzEB/8Aqv1xxfJqj21/VlPhnCz/AC/vP/L0KTlNrGHz2xSDpaWE9rT8llHEWaL+D4Jj3ZmFz0d5QqepcI3gwyHIBxBY48Gv49BAW+maLdJ6OVxXheXDE2r70fLv+FwC3OaVAIBAIBAIBAIBAIBAIBAIBAIBBlePSRQS1VRe4c8vceNgGho7Rl0lRWsV3LffLfLFMflEahmvPOke6aT05Df6rPVaOgBU8luaXoeDwRipD2dFTeqph/qR/EFb6R2cziLb5vu3NbnKZpyoaWFodSQutumeDnc2+jBHR6XdxVbPk8odvwzg4mYy3j6R/dmlMywVaIdu07l2UsXekopZSRFFJIRtEbHPt16oy7VMVmezXbLSnxWiPu7VGD1LBd9LO0cTFIB2m1gp5ZjyRXPit2tH5hCusW0IJmE4m+nkEjCRsuL7R+fArKtuWdtObFXLXlltujWNtq4Q8HzhbWHwNu/tBV2s7jby+fFOK81l6c0Qe0tcLgixWTSzfHMOE8ckF/PY9wad7ZWHLquLdjlhkpGSq7wme3C5Yt5T3+cSoEbjbMWIyIO0EZEeC5z1/TvBylGwgEE3CMUlpZhNC7VcNvsubva4bwVlW01ncNWfDTNSaXj/ANN80dxZlXTMnZkHDMb2vGTmnqN1frbmjbx/EYLYMk47eTrjGINghdI7dsHFx2BTM6hhjrzWiGM6V6QPlcWBxz9M8fcHAKnlvudPUcDw1a1i2vorC0uiVAl0CoPa0NwryqtiiIu0O13/AGbMzfrNh2rPHXmtEKnHZ/Y4LWjv2j7t+C6DxxUAgEAgEAgEAgEAgEAgEAgEAg87H6zmoHOBzPmt+s78hc9iDENOKvWdHTg5frH9QyYD4nuWvNbUadHw/Dz35nhFU3oXqaHu/Tab7SNW6+TzuafibDpRi/klLJN6ws1g4yONm9gvc9AKyvblrtX4XD7bJFPJgOIyEkXJJJuSdpJzJPaqNnrccaOaMkQn4BhL6ypZTsOqDm93sRj0j8h0kKzixecuPx/GzWfZ45+st3wnDIqaJsMLAxje9x3ucfWceJVjs4czvrKYEFa0n0Ogq2khoimt5sjQBc7hIB6Q8Vrvji0LvDcbkwz1ndfSf7MarqR8MjopG6r2OLXDpHDiN4PAhU5jU6ejpet6xavaXBQzWjQDGjT1TWk+Y86ruFnZX7DY9hVjBbryuV4ph5qe0jy7toVlwWX4nU81jFRET5sxjcOh/MtPjmO5aq21kmHUyYvacFTJHeu4+21d0qo+bnLxslGt1SNsH/0ntKr8RTltv1dXwriPaYeWe9en2ns1vBdEKF1PE91HCXOjYSSwEkloJJurFcdNdnEy8bxEXtEXnvPm61mglA9pHkrWHjHdhHdkpnDSfJFPEeJrO+eZ+vVieK0ZgqJYCbmKRzL8QDke0WKp3pyzp6ThOJ/iMUX7eqKsFpqPIzVHm6iK+QcyQdBc0tP4ArXDz0mHn/Gqe9S32/CXyr4gY2QsvtL3np1QAPxFb7dnM4b4v2ZIXE5nacz1rnd3sqxqIghKJ21vQjQWAU7JqmISySAP1XjWYxpzaNU5E2tclW8WGIjc9Xm+O8SyTkmmOdRHp5rFiWh1DMzVNLGzg6JojeOpzQPFbfZ19FGOM4iO17fmWaY5ybVkLz5Paoi3ZtZKOhwNmnrHcFqvw8fy9HQ4fxi9Z1ljcfutHJTgEkDZZponRvcRG1r2lrgxubjnxJ/lTBjmu5lj4pxdM3LXHO47tBVhyAgEAgEAgEAgEAgEAgEAgEAgEFU01n86OPoLj25D5qYGI4hNzlVNJ7+oPqsyCqZrbtp6Lw/Hy44lzK0ryboY/wDT6X7WNXKvN5Z7rpyt1x14IAcg10jh0k6rPAP71rzz2he8Jxxq1/szKt9Jqqy7dO0upOSzrG500Zsns6Tb0afyP4aGwzVBGb3iNp9xgDj3lw+6r0PKXmZnctCUsAgEGZ8ruFgOiqmj0von23kAuYT2aw7Aq2evm7fhWWZi2OfLrDO1XdcrHWIPBZVnUxLXmpF8dqz6PoLBKvnqaGX242OP1rZ+N1feRmPJlXKW4sxMvbkRHC8dYFh+FVMs6vt6Lw6Ivw3LPaZmHfSZokpRIN2q8fVdYH8Q7lt4iN49qXhVpx8TyT59Pw1/Af8A4sH2Uf4Atle0Odm/Ut9ZJi+NQUzC+WRrbDJtxrOPBrdpKyYREy+fcWrDNUSzEWMkjn24XOQ7BkqOa27PUeGYrY8Pvec7RlqdFqHIzSHUqJrZOcyMdJYC42++Fa4eO8uB41eJtSv3HLXAeap5QMg98Z6C9tx+ErfaNw5OG3LeJ+bL7rnPa72Qi+SG276CaQR1VIwAgSRNayRm8FosHAeybXBV/FeLVeS47hrYMs77T1iVlWxSCAQCAQCAQCAQCAQCAQCAQCAQCAQCCg6YS/pEmfosA7mk/NZQMorIwJH29ont3qjl+OXpuB/Qq4Fq1rWz9DH/AOYUv2sfxCuw8zk7ysXKLLr4jKPYEbB/Da74uKr5fidrw+vLw9fnv+qn4g3YelabOhjk+PO3/d391uw/E5/iM6xa+ba+TiPVw6LpMh/nI+StPO37rMpYhAIKxykU+vh0vuGN47HgfAla8sbqu+H25c9fwxfVVN6TY1UNtr5O5S7DYOjnG/dleFfr2eTzRrJaPmonKo3/ADC/GGP8T1VzfF9nc8Ln/Q+8/wBj8KPOYfY52ZIz7pdbwAW+vvYlDP8A6XG7j1ifyrkOIyWs2Z1rbA92zquqsZradm/h2CbTMxP5RHYgHnOTPp296ictp82zHwGHHO4qe1t9hWGlnb0sBwOSrnEMdrnNzjsay+bjx27BtWVMc2nUNHEcVTBTmt9vm3jAsKZS07II/RYNp2ucfScekm5V6tYrGoeTz5rZsk3t5uWk+DNrKWSB2WsPNd7Mgza7sPhdZNTAKugkgkdDK0tkYbEHhucDvB3FUctOWz1nAcTGbDHrHSXLUWvS5tJw+slgkEsUhY9uwg7t4I2OHQVMTMTuGGSlMlZreNw1DRzlKjeAyrHNP/aAfRHr3s8R0q1TNE93B4nwq9euLrHp5r5BM17Q5rg5pzBaQQR0ELe5MxMTqXREBAIBAIBAIBAIBAIEQCAQCAQCAQZ9paz6Wc9H9IWUdiGY4kPpX9fyVLLHvy9LwU/6FfojWWGlpy0QNq+l+2i/EFch5nJ3t91i06bbEqn67f8A1Rqvk+KXc4P/ALen+ecq3WRXYejNarR0XKT1caB18ug/JbMHdS8Tj3I+rc+Tuxw6LoMg/wBxyuVjcPO5PiWTUU6YjUTSBqJoeFpywf4bU/ZH4ha8se5K1wX69Pqw2ypaemFk0ls3JlH/AJZF9aY/7z1fpHuw8txP61vrKlcqw/Tx9gz8T1Wzx7zseF/o/f8A4JoazWoj9eXxW3B+n+VLxLpxX/iz6Rjmi65+pes5olDujDZzZCNhIQ2nUWMzRPa9jyHNNwRkQR0rKLTHZryYqZK8to3Dd+TnThuIRmN9m1EYu5o2PZkOcZ2nMbrjiruLJzx17vMcfwU8PbdetZ7LmtrnvG0j0agrWWlbZ49GRuT29u8dByWNqxaNS3YM98N+av8A9ZHpJolUUZJc3Xi3SsHm298bWHry6VUvjmr0nDcdjz9O0+jwFrXApHq4DpDUUbrwv82+cbrmN37u49IsVlW817K/EcLjzxq8dfXzbForpPFXR6zfNkb6cZNy2+wji022q3S8Wh5viuEvgtqeseUvdus1UIBAIBAIBAIBAIBAIBAIBAIBBR9MIvpZPeZf+W3yWUdiO7LMXZaU9IB8P7KpljVnoPD7bwR8togWpeRNGDaupvtovxtVyvaHmsvx2+648pMOriUp9tsTv9sN/oK0ZY992PD7b4evy3/VV1qXEOGLVl6CDb/vYssXSzTx3vYd+kw2TkqqdakfHvjlP3XgEeIcrtOzzmWNSuqyaggEFb5RJtXDZ/eDWdrntWvLPuSucDXeerEFSekF0G8aE0vN4fTNO3mw49byX/1K/XpDyma3NktPzlmfK/J+nho28xH4ueqvET7zu+FR/o7+c/2S9GWiPDydwEp7rj5Ldi6Y3P4yfacXr6Q1jA4x5LDkP1Ue73Apr2U80z7S31l2qaCKQWkhjeODmNd8Qp1DCL2jtLJOVvQunp4WVNNHzZMgY9jfQN2khzW+qfN2DJV8uKNbq7Ph3H5JvGPJO99pZSRZVHferori7qSshna6wa9utwMRNng/uk+CzpbltEq/E4oy4rVn/JfUjTcAjf8ABdF40qBHNBFiLjhxQUzSPk8gnu+D6CTbkPo3Hpb6vWPFarYons6XD+J5MfS/vR+7I62B0MroZBqyMNnNO0Ho4i1jfpVW1ZrPV3sGemavNSXO6htT8CxZ9LUMnZ6p84e1GfSaeseNllW3LO2rPhjNjmk/5L6App2yMa9pu1wDgeLSLhXonbyFomszE+TqiAgVAIBAIEQKgRAIBAIC6CFW4rFFk52fsjM/27VjNohux8PkydoQDpPF7L+4fmsfawsfwGT1hFptOaSSoZTtc7Xe7VGQLQ6xsC69gTa1ulTF4lqvwt61m3SdDS6DzmP4gsPZmPiVtqrMo0jp9XVdwJYezNvgq+aO0uv4bk62p93iBV3Wc9DotfEaZvGaM9ztb5K5XtDzWb47fVofK7SWlgmAycx8ZPvMIc3wee5a88dYl0PC77rav3UBaHUNcN/DNTE9WGSvNSarlydYsIKrVcbMmAYTuD7/AEZ7yR+8rNZ6uFmxzMfRrq3KQugEGecr+JARQ04Ob3864e40ENv1uJ+6q+eemnV8Mx7ta/p0ZddVnZ2k4ZRGeeOAbZHtZ2E5nsFz2LKsbmIYZb8lJt6Q+iWNDQGgWAAAHAAWCvvKMa5UBfE3HhFEB3E/NU8se+9D4dOuHiPnL3aClDaaOJwyLQHAi+3znXG/erVa6rpxMuSbZZvHqtVBiD2NDWSNc0AANNsgBkM7FNNczudyn/49q/rIyOkH5H800ahgmkWmdXVSSiSUmIzOeyIhuqwNJDADa+Q6VjMbZ1vyWi1fJ5bcQa7J7PmtM4I8pdXH4vaPir+COjhdsNj2rTOC0L+LxPBfpM6+r6a0erGSUsLmyNf9FHrFrgbO1Be9tiuV7PN5fjtr1l2wzFIahhfDIHgEtNtocDYgjaFLCYmO6YiAgxnlmpWGsYRbWdCNbjcOIae74LC9YtGpWuFyWxW56syhqntNtY9SoT0nT11LReIn1elDV3Nj3pEk19G+8nc5fhsBO4OZ2Me5o8AFexz7sPJ+IV5eIssi2KYQKgEAgEAgEAgRAIBBW+UJ0gw6Z0T3Mc3VddpIOoHjWzG611hl+GVzgOX+IrFoYr/ik37Z/wB4qk9RqPRxqK2V4sZXkbxrGxG8HjtUxOmu+OLRpLw6k2Fp6RY2IPyWXNtWnFyd42vJ0nkMIjqHMIu2z3ZPvsGz0u5b6ZNd3NzcDExM0idoWO0Wu1w9sZdD27Ph4LdevNGlHh8vs7xb0UNxte+6/eFS15PSc0a29vkiw0yYgJbebTsc8/XcCxnxcf3VdrDzGS25mWoadYWamie1ou9lpGdJb6Q7W6w7ky03Vu4PN7PLEz2noxPWVF6IXUjvSP8AV7urgtlbKWfDqeaGiaOacljBHUAuAFhIM3WGwOG/r2rfXJ6ubk4bfWqyDTCjIvzx6ubkv+FZ89VecGSPJ5eM6fwxMJY0ngXeaL9Ddrj3LG2SIbMXCXyTqGTYtir6iZ00jruce5o2NHQFUtbmnb0GHDGKkVhCMwWO23S+ckuGmSd9U5tmRDUYTvleM7dTfxhb8FdzzOZ4nl5aRjjvPf6NX5xW3DZVjkHlGMzezGY7/uxNsO+/cq0xzZZdb2nsuDiI7zvX5RdMMWcyWNjHWLQXO63W1R3X71lkzcs6auE4Cc9JtvXp/dGpdI5QPObcdhWUZKyrX4e9Z1raVV6Z6kT7EghpsNo1iMsj0rLcT2appaO8M0jqT0FGLu2ojPpMt0goOjaaN3oygHg4EeOxB0jpJ4jrx6wPtRuzt1tKhO5SMI0hqaV+tE8tO/p61GmftN9+q9YZyyzNFpqdj/eadUnrFrJ1R7k/J6UvK4Xi0cUbT75cbdhABUTMttceOfNR8Yr3zSOmmk1nuzJyueAAGQC1Wvy93QxcNbJ0rHRWdU61yN5PeqczudvQY68sRHokx5oymX0ZoBSmLDadrhYlmuf3yXfAhdDHGqw8fx14vxF5j1WC62KouoBdAqAQCAQKgEDVIS6Aug41cLZI3RvF2vaWuHFrhY/FJjaa2msxMeT58x7CH0lQ+B/qm7Xe3GT5rh127wVQvWazp63BnrmxxeP8l591i3EuhsIle9Hq7yiDVcfPZZp7PRd4eCvYb81fm8vx/D+xy9O09YeHpDgkj5BzMZc6U6paPVfvJO4WF7rGcfvbbcfGawWpPftH3aHobgzKGm5sODpHHWkdxfuA6AMh2net8RpzZnb3vKlKGS6dYF5PMZYx9DKSRbYyQ7WHoO0d25U81OWdx2d/guJ9pTlt8UKvdaV4hQd46143g9Y+ayi0w12w0t5HOxGTcWjqb+annljHD4/RCmBcbucSeJWE9W6uqxqI0ZzATTLmSsNwp88rYo9rt52NbvcegKa0m06hry5oxV5rNnwaKOmgZDH6LBt3ucc3OPSTmuhWIrGoeZy5bZbzeyU+vAzupalRgc2NstS/IyOdK6+3VPojusFriIrEzKzkmctq46+XSGeVtUZZHSO2uN+rgOwABULW5p29PhxRipFI8kewUNu0XEaYvYA0gEG+a2Y7RWdyp8bhvmx8te7x5KeRu1h6xmPBWovWe0vP5OFzY/irLm2dZq7o2YIO8NUWm7XEdRQegzGXnJ4bIPeAv37UD/KKd/pRujPFp1h3H80C/wCHsd+rnaeh12HxyQc5aSaPa0245Ed4WM1ie7ZTLek7raYc21PFvyWqcFZXsfiuevfUvUwOopjOzyhzmRa132aXEtGerYcdnasI4fUrVvF4mk6rqz6BwnSejqABBUxO4NvquHAajrHwVtw3sa6Bwcmgt0C3UBboBAqgCAQMJWQYXqdIcZJiEHn1Nc8bGqRUtK2+VM1ZIiS3NrgPOaTwO8dGxYXpF46rHD8TfBbdfx6s4q8KlYbc29w4hjvhZVLYbR26u7h8Sw3+L3Z/ZFNPJ+yk+478lr5Lei5GfFPa0fknk8n7KT7jvySKWnyRbiMNe94/KVhVRPDKHsp5XbnDUcAW7xmFvxY71nbl8dxmDJSaRuZ8vk0ON2uA9twbDbcHqI3FWnEQKrGJ4nWc3Wadjh8CNxTYaNKjvaQmxxq9JI5GFkjdZrhYg7wonUxqWVLWpPNXupVaxrXeY4lu6+0dB49aq3xTHZ2+H46mTpfpP7I+stK+NZAayBNZAgkF9vzWdcc2Vc/F48UdZ3PpCz4PjkMDdWNjrn0nH0nH5DoVulYrHRxM/EXzW3b8PUj0mLvRjcVntoSKKeSpN3DViBzH7Rw9W/sg7e7isd7no2zWKV695/Z4mmOIvkdzMcbyxpu4hjiHOGy1hsHxWnNzW6RC/wCHzhx7ve3XyVnmJP2Un8N/5LR7K/o6v8dw/wDu/qPJ5P2Un8N/5J7K/ofx3D/7v6jmJP2Un8N/5J7K/oieO4eP5v6gU026CX7hHxWcYLebRk8UxRHuxMuseESO9Kl1r+00+C30x8rj8TxNs09YiP8APU2TQ1zs2xvYe8eK2aVkCp0Nq2ZtZrjuPcVGh5NVRTxfrIZGjiWG3fsQcWVKDo2YIJVPXPb6LyO1BK/xMu9NjX9NrHvCBC6J3tM8QgQ01/RcD8fFQPUw3SaupbCKplaB6pOsz7rrhSLdhfLDUssJ4I5RvLbxu8LjwTYuGFcq1BLYSGSEn22lzfvMv4qdoXDDsXgnF4Z45B7jwT3bQiU+6BboBQFQF1A5FZoNIQMLUHN0IRLi+lBUjm6hbwUGzDQN4KU7MNAOCBhw8cENolbhGsLtycO49B/NQh4MseZDhYjIgoOQoY3ZFoBRJsuj0Z9RBEk0VhPqeJQR3aHQ+w4dTisZpWe8N2PPkx/DaXM6GQ+/97+y1+wqsR4hmjzj8AaGQ+/97+yewqmfEM3y/B40Og3scet5WcY6x5NF+Jy3+KzrFolANkQ7SSstK6S7BoIml7msY0bXOsAO0pOojcprWbTqsblHZBzvotMcHEjVklHADbGzp2noWPW30b/dxfO37R/y92hw/WA83VjAs0AWuBssNw+KzjorzMzO5TjQonZvkSA8iQHkSA8iQOFEhs8UQ4Ig4UY4IA0A2WQePiOg1FPcyUrNY+s0aju9tk0KviXI5E65gqZIzubIBI3vFnfFRyiqYnyX4lDmyNk7eMTxrW+o+x7rqNIVStppoDqzQyRHhIxzPxDNBzbUqB1bOFI7sqiN6Dp5Rfa0diAu077IHMLmkOa6xGwg2I6iNiDdtCMZmNHGXvc45Zv84m7Gu2n61uxTEC5YfiAky2OG7iOIQTUCoBQGELJBCECWQIQgbZAlkCWQIUDbIEIQQcRw1kwzycNjhtHXxHQiVarqN8J89txueM2/26igbBVEbDccD/3JBOjq2HaCPEIl2aWHY4d6kO5kIEMQ32QcnPYN4PVn8FGxEqqo2OoGg7i+5F/qtIv3qJ+TKOWJ6vIZR68gc9zp5L3aCBqsP+nGMm9Zz6VjFPOerZbPOuWkcsfv+VjocH9aWxO5gzA+sd/Vs61saHq6oRJC0IG6qBCEBYIDJAZIFBCBdYIF1wiCh4QPDwgUSBSCUMeNV7WuHBwDh3FQKvinJ3hdRcmlbG4+tATEb9TfN8FHKKbivIqMzS13U2do/HH/AMVHKKdivJ3idPcmm51o9aBwly+qLO8FGpFamL43ar2OY7g9pae45qA5tSpHeB2s4NBzcQO/eg2vAajVp2N1srXAO4H0QenVsFlED1cOri2ZhBz1gLcQTYjxQX9QFCAQIgQhAmqpQQhA0hAhCBpQcygY4oOEkpCJRZawjcVOhDnxUj1Cey6CvV9Sy92wStPutOr938rKB5oxhwNjDN1iNxHcgmRYoDuP7zHt+IQ27itHD4obMfiIG7wcfghtCqMctsjmd9WJ9u8gIGU+JFx86CfqDLd5KD3qLFtUWZA5vHzTc9Z2lNifHiLj6pUju2pcdyDq15QPBKBbFAhBQNN0DCSgYXFA0vKBhlKBpnKBhqXIGmrcg5urnoOZxJ/Smxzdi7xuKDk7HpB6pUbEHEcYErS2ambK3hIwPH8wQU3FtHqKW5bSSQnjCSB911x8FGh4I0bMbw5nOPA3OZY26xkoFhpKyo2c0/uNlIv2htCGvEsri549FoBDGniSc3FShf45roO7XKEnIEQIUCFSgiBqBpQNKBrggaQgbqDggTmhwCBOZb7IQOELfZHcgXmm+yO5AojHAIF1BwCBNQcAgaYm+yO5Ax0DfZHcg5up2+yESYYG+yFITmhwQJqDggXVCBNVAFqBpagaWhAzVCBCwcEDSwcEDSwcECGMcECc2OCBphbwCBDA32QgTydvshAeSs9kIAUjPYCIObRR+wO5B1ZQx/s29yCVFRx+wO5QJccLRsaEEqNoQdmhQk5B/9k=" id="190" name="Google Shape;190;g95f015ef34_0_0"/>
+          <p:cNvPr descr="data:image/jpeg;base64,/9j/4AAQSkZJRgABAQAAAQABAAD/2wCEAAkGBxMSEBUSExAVFRUVFRUVFxYVFRUVFRUQFRUXGBUWFRYYHSggGB0lHRUVITEhJSkrLi4uGB8zODMtNygtLisBCgoKDg0OGhAQGi0fHyUtLS0tLS0tLS0tLS0tLS0tLS0tLS0tLS0tLS0tLS0tLS0tLS0tLS0tLS0tLS0tLS0tLf/AABEIAIsBbAMBEQACEQEDEQH/xAAcAAABBQEBAQAAAAAAAAAAAAAAAQIEBgcDBQj/xABIEAABAwICBQcIBggGAgMAAAABAAIDBBEFIQYSMUFRBxNhcYGRoRQiMkJSYrHBI3JzkrLRJDNTgpOiwuEVJWOj0vCDszRDRP/EABoBAQACAwEAAAAAAAAAAAAAAAABBAIDBQb/xAA1EQEAAgIABAMHAgUDBQAAAAAAAQIDEQQSITEFQVETIjJhcYGRM6EUQrHB8CNS0RU0kuHx/9oADAMBAAIRAxEAPwDcUAgEAgEAgEAgEAgEAgiVeIxR+m8Do2nuCDyKjSpg9BhPSclOh5tRpg4bebZ1kfNNDiNLpDsew9QCDvFpbJvDD4FNCfT6VtPpxkdIN/BND2KPE4pfQeL8Dke4qNCYgEAgEAgEAgEAgEAgEAgEAgEAgEAgEAgEAgEAgEAgEAgEAgEAgEAgEAgi11eyFus91uA3nqCCnY5pYQ0kvETL2GfnOJ3DeT0BSPPosOqqjzgzmGH15gTIRxbCCCP3iOpNpe3TaKwjOV0kx99xa3+HHZvfdQh6lLh8MQtHDGz6rGt+AQStY8UDJYw4Wc0OHSAfiggzYLA7/wCvVPFhLfAZeCDzarR97c4363Q7zXdh2HwU7BQ47NC7UkBIHquycB0FToWugr2TNux1+I3jrCxEpAIBAIBAIBAIBAIBAIBAIBAIBAIBAIBAIBAIBAIBAIBAIBAIBAIPNxnFWwN4vPot+Z6EGdYliss04hhbz1S4XsTaOJntyu9RvAbTuUzOuzOtdxueyyaP6Ksp3CaV3P1Nv1rhYMvtbCzZGN2WZ3lY6RNt9IWBSxCBHuAFyQBxJsO8oRG+zzZ9IqRhs6rhB+0afgVjN6x5t9eFzW7Un8GR6T0R2VkP3wPio9pX1TPCZ4/kn8PQp6uN4uyRjh7rg74FZRMT2arY7V7xMOylg5VNKyQar23HiOo7kFeqqKSmdzkbiW8d46HDh0qRZcFxds7bbHjaOPSE0PUUAQCAQCAQCAQCAQJdAXQKgEAgEAgEAgEAgEAgEAgEAgEAgEAgEGeVem9UK6WmZDCWRvILzr3DBbM2Nr5rRGS035Yh1Z4PDThozXtO5jt07q5phpI6PYdaeW+qDsa0eu4cBuG9br3ikKXD4LZrah5eieJTRujijk1edlYZXgDnJXF9rveczlkBsC1VtMrmbBSu49G0FbnLIgz7SrlHbG4w0YbI4ZOldnG08GD1z07OtV75/KrscL4XNo58vSPTzZ5iOJzVBvNM+Q+8ch1N2DsCr2tM93Yx4ceONUiIRAsW3YQPhlLDrMcWni0lp7wpRaInv1WnA9PamEgSO55nvemB0Hf29620yzChn8PxZO3SWnYFj8NUwOjdnvG8Hhbj0K1W8W7OFxHDXwzqz1SN3/bLJXVrEqN1O8Sxkht/unh1LLY8XHuUWrp5QzmYSx4ux5D7m1tYHztoJ8RxVXLltS2tOzwPh+DicfNzTuO8dHnO5UKw7GQD9x//ADWv+Isux4Ng9Zc3cpld/oj/AMZ/5KP4i7L/AKRw/wA/yWLlNrQcxC7rjcPg5Iz3RPg/D+W4+72sM5Vhe1RTWHtRO1v5HW+K2V4j1hVy+CzH6dt/Xp+6+YPjMFUzXglDxv3OaeDmnNp61vraLRuHHzYMmG3LeNPQWTUEESuxBkQ8457gNp/IKJtEd23FhtknVVFxvlLawlsLA8jffzAfrb+wdqr3z67Oxg8H5o3klVqjlDr3bJWs6Gxt/qutXtryv18K4aO8b+7i3TzEB/8Aqv1xxfJqj21/VlPhnCz/AC/vP/L0KTlNrGHz2xSDpaWE9rT8llHEWaL+D4Jj3ZmFz0d5QqepcI3gwyHIBxBY48Gv49BAW+maLdJ6OVxXheXDE2r70fLv+FwC3OaVAIBAIBAIBAIBAIBAIBAIBAIBBlePSRQS1VRe4c8vceNgGho7Rl0lRWsV3LffLfLFMflEahmvPOke6aT05Df6rPVaOgBU8luaXoeDwRipD2dFTeqph/qR/EFb6R2cziLb5vu3NbnKZpyoaWFodSQutumeDnc2+jBHR6XdxVbPk8odvwzg4mYy3j6R/dmlMywVaIdu07l2UsXekopZSRFFJIRtEbHPt16oy7VMVmezXbLSnxWiPu7VGD1LBd9LO0cTFIB2m1gp5ZjyRXPit2tH5hCusW0IJmE4m+nkEjCRsuL7R+fArKtuWdtObFXLXlltujWNtq4Q8HzhbWHwNu/tBV2s7jby+fFOK81l6c0Qe0tcLgixWTSzfHMOE8ckF/PY9wad7ZWHLquLdjlhkpGSq7wme3C5Yt5T3+cSoEbjbMWIyIO0EZEeC5z1/TvBylGwgEE3CMUlpZhNC7VcNvsubva4bwVlW01ncNWfDTNSaXj/ANN80dxZlXTMnZkHDMb2vGTmnqN1frbmjbx/EYLYMk47eTrjGINghdI7dsHFx2BTM6hhjrzWiGM6V6QPlcWBxz9M8fcHAKnlvudPUcDw1a1i2vorC0uiVAl0CoPa0NwryqtiiIu0O13/AGbMzfrNh2rPHXmtEKnHZ/Y4LWjv2j7t+C6DxxUAgEAgEAgEAgEAgEAgEAgEAg87H6zmoHOBzPmt+s78hc9iDENOKvWdHTg5frH9QyYD4nuWvNbUadHw/Dz35nhFU3oXqaHu/Tab7SNW6+TzuafibDpRi/klLJN6ws1g4yONm9gvc9AKyvblrtX4XD7bJFPJgOIyEkXJJJuSdpJzJPaqNnrccaOaMkQn4BhL6ypZTsOqDm93sRj0j8h0kKzixecuPx/GzWfZ45+st3wnDIqaJsMLAxje9x3ucfWceJVjs4czvrKYEFa0n0Ogq2khoimt5sjQBc7hIB6Q8Vrvji0LvDcbkwz1ndfSf7MarqR8MjopG6r2OLXDpHDiN4PAhU5jU6ejpet6xavaXBQzWjQDGjT1TWk+Y86ruFnZX7DY9hVjBbryuV4ph5qe0jy7toVlwWX4nU81jFRET5sxjcOh/MtPjmO5aq21kmHUyYvacFTJHeu4+21d0qo+bnLxslGt1SNsH/0ntKr8RTltv1dXwriPaYeWe9en2ns1vBdEKF1PE91HCXOjYSSwEkloJJurFcdNdnEy8bxEXtEXnvPm61mglA9pHkrWHjHdhHdkpnDSfJFPEeJrO+eZ+vVieK0ZgqJYCbmKRzL8QDke0WKp3pyzp6ThOJ/iMUX7eqKsFpqPIzVHm6iK+QcyQdBc0tP4ArXDz0mHn/Gqe9S32/CXyr4gY2QsvtL3np1QAPxFb7dnM4b4v2ZIXE5nacz1rnd3sqxqIghKJ21vQjQWAU7JqmISySAP1XjWYxpzaNU5E2tclW8WGIjc9Xm+O8SyTkmmOdRHp5rFiWh1DMzVNLGzg6JojeOpzQPFbfZ19FGOM4iO17fmWaY5ybVkLz5Paoi3ZtZKOhwNmnrHcFqvw8fy9HQ4fxi9Z1ljcfutHJTgEkDZZponRvcRG1r2lrgxubjnxJ/lTBjmu5lj4pxdM3LXHO47tBVhyAgEAgEAgEAgEAgEAgEAgEAgEFU01n86OPoLj25D5qYGI4hNzlVNJ7+oPqsyCqZrbtp6Lw/Hy44lzK0ryboY/wDT6X7WNXKvN5Z7rpyt1x14IAcg10jh0k6rPAP71rzz2he8Jxxq1/szKt9Jqqy7dO0upOSzrG500Zsns6Tb0afyP4aGwzVBGb3iNp9xgDj3lw+6r0PKXmZnctCUsAgEGZ8ruFgOiqmj0von23kAuYT2aw7Aq2evm7fhWWZi2OfLrDO1XdcrHWIPBZVnUxLXmpF8dqz6PoLBKvnqaGX242OP1rZ+N1feRmPJlXKW4sxMvbkRHC8dYFh+FVMs6vt6Lw6Ivw3LPaZmHfSZokpRIN2q8fVdYH8Q7lt4iN49qXhVpx8TyT59Pw1/Af8A4sH2Uf4Atle0Odm/Ut9ZJi+NQUzC+WRrbDJtxrOPBrdpKyYREy+fcWrDNUSzEWMkjn24XOQ7BkqOa27PUeGYrY8Pvec7RlqdFqHIzSHUqJrZOcyMdJYC42++Fa4eO8uB41eJtSv3HLXAeap5QMg98Z6C9tx+ErfaNw5OG3LeJ+bL7rnPa72Qi+SG276CaQR1VIwAgSRNayRm8FosHAeybXBV/FeLVeS47hrYMs77T1iVlWxSCAQCAQCAQCAQCAQCAQCAQCAQCAQCCg6YS/pEmfosA7mk/NZQMorIwJH29ont3qjl+OXpuB/Qq4Fq1rWz9DH/AOYUv2sfxCuw8zk7ysXKLLr4jKPYEbB/Da74uKr5fidrw+vLw9fnv+qn4g3YelabOhjk+PO3/d391uw/E5/iM6xa+ba+TiPVw6LpMh/nI+StPO37rMpYhAIKxykU+vh0vuGN47HgfAla8sbqu+H25c9fwxfVVN6TY1UNtr5O5S7DYOjnG/dleFfr2eTzRrJaPmonKo3/ADC/GGP8T1VzfF9nc8Ln/Q+8/wBj8KPOYfY52ZIz7pdbwAW+vvYlDP8A6XG7j1ifyrkOIyWs2Z1rbA92zquqsZradm/h2CbTMxP5RHYgHnOTPp296ictp82zHwGHHO4qe1t9hWGlnb0sBwOSrnEMdrnNzjsay+bjx27BtWVMc2nUNHEcVTBTmt9vm3jAsKZS07II/RYNp2ucfScekm5V6tYrGoeTz5rZsk3t5uWk+DNrKWSB2WsPNd7Mgza7sPhdZNTAKugkgkdDK0tkYbEHhucDvB3FUctOWz1nAcTGbDHrHSXLUWvS5tJw+slgkEsUhY9uwg7t4I2OHQVMTMTuGGSlMlZreNw1DRzlKjeAyrHNP/aAfRHr3s8R0q1TNE93B4nwq9euLrHp5r5BM17Q5rg5pzBaQQR0ELe5MxMTqXREBAIBAIBAIBAIBAIEQCAQCAQCAQZ9paz6Wc9H9IWUdiGY4kPpX9fyVLLHvy9LwU/6FfojWWGlpy0QNq+l+2i/EFch5nJ3t91i06bbEqn67f8A1Rqvk+KXc4P/ALen+ecq3WRXYejNarR0XKT1caB18ug/JbMHdS8Tj3I+rc+Tuxw6LoMg/wBxyuVjcPO5PiWTUU6YjUTSBqJoeFpywf4bU/ZH4ha8se5K1wX69Pqw2ypaemFk0ls3JlH/AJZF9aY/7z1fpHuw8txP61vrKlcqw/Tx9gz8T1Wzx7zseF/o/f8A4JoazWoj9eXxW3B+n+VLxLpxX/iz6Rjmi65+pes5olDujDZzZCNhIQ2nUWMzRPa9jyHNNwRkQR0rKLTHZryYqZK8to3Dd+TnThuIRmN9m1EYu5o2PZkOcZ2nMbrjiruLJzx17vMcfwU8PbdetZ7LmtrnvG0j0agrWWlbZ49GRuT29u8dByWNqxaNS3YM98N+av8A9ZHpJolUUZJc3Xi3SsHm298bWHry6VUvjmr0nDcdjz9O0+jwFrXApHq4DpDUUbrwv82+cbrmN37u49IsVlW817K/EcLjzxq8dfXzbForpPFXR6zfNkb6cZNy2+wji022q3S8Wh5viuEvgtqeseUvdus1UIBAIBAIBAIBAIBAIBAIBAIBBR9MIvpZPeZf+W3yWUdiO7LMXZaU9IB8P7KpljVnoPD7bwR8togWpeRNGDaupvtovxtVyvaHmsvx2+648pMOriUp9tsTv9sN/oK0ZY992PD7b4evy3/VV1qXEOGLVl6CDb/vYssXSzTx3vYd+kw2TkqqdakfHvjlP3XgEeIcrtOzzmWNSuqyaggEFb5RJtXDZ/eDWdrntWvLPuSucDXeerEFSekF0G8aE0vN4fTNO3mw49byX/1K/XpDyma3NktPzlmfK/J+nho28xH4ueqvET7zu+FR/o7+c/2S9GWiPDydwEp7rj5Ldi6Y3P4yfacXr6Q1jA4x5LDkP1Ue73Apr2U80z7S31l2qaCKQWkhjeODmNd8Qp1DCL2jtLJOVvQunp4WVNNHzZMgY9jfQN2khzW+qfN2DJV8uKNbq7Ph3H5JvGPJO99pZSRZVHferori7qSshna6wa9utwMRNng/uk+CzpbltEq/E4oy4rVn/JfUjTcAjf8ABdF40qBHNBFiLjhxQUzSPk8gnu+D6CTbkPo3Hpb6vWPFarYons6XD+J5MfS/vR+7I62B0MroZBqyMNnNO0Ho4i1jfpVW1ZrPV3sGemavNSXO6htT8CxZ9LUMnZ6p84e1GfSaeseNllW3LO2rPhjNjmk/5L6App2yMa9pu1wDgeLSLhXonbyFomszE+TqiAgVAIBAIEQKgRAIBAIC6CFW4rFFk52fsjM/27VjNohux8PkydoQDpPF7L+4fmsfawsfwGT1hFptOaSSoZTtc7Xe7VGQLQ6xsC69gTa1ulTF4lqvwt61m3SdDS6DzmP4gsPZmPiVtqrMo0jp9XVdwJYezNvgq+aO0uv4bk62p93iBV3Wc9DotfEaZvGaM9ztb5K5XtDzWb47fVofK7SWlgmAycx8ZPvMIc3wee5a88dYl0PC77rav3UBaHUNcN/DNTE9WGSvNSarlydYsIKrVcbMmAYTuD7/AEZ7yR+8rNZ6uFmxzMfRrq3KQugEGecr+JARQ04Ob3864e40ENv1uJ+6q+eemnV8Mx7ta/p0ZddVnZ2k4ZRGeeOAbZHtZ2E5nsFz2LKsbmIYZb8lJt6Q+iWNDQGgWAAAHAAWCvvKMa5UBfE3HhFEB3E/NU8se+9D4dOuHiPnL3aClDaaOJwyLQHAi+3znXG/erVa6rpxMuSbZZvHqtVBiD2NDWSNc0AANNsgBkM7FNNczudyn/49q/rIyOkH5H800ahgmkWmdXVSSiSUmIzOeyIhuqwNJDADa+Q6VjMbZ1vyWi1fJ5bcQa7J7PmtM4I8pdXH4vaPir+COjhdsNj2rTOC0L+LxPBfpM6+r6a0erGSUsLmyNf9FHrFrgbO1Be9tiuV7PN5fjtr1l2wzFIahhfDIHgEtNtocDYgjaFLCYmO6YiAgxnlmpWGsYRbWdCNbjcOIae74LC9YtGpWuFyWxW56syhqntNtY9SoT0nT11LReIn1elDV3Nj3pEk19G+8nc5fhsBO4OZ2Me5o8AFexz7sPJ+IV5eIssi2KYQKgEAgEAgEAgRAIBBW+UJ0gw6Z0T3Mc3VddpIOoHjWzG611hl+GVzgOX+IrFoYr/ik37Z/wB4qk9RqPRxqK2V4sZXkbxrGxG8HjtUxOmu+OLRpLw6k2Fp6RY2IPyWXNtWnFyd42vJ0nkMIjqHMIu2z3ZPvsGz0u5b6ZNd3NzcDExM0idoWO0Wu1w9sZdD27Ph4LdevNGlHh8vs7xb0UNxte+6/eFS15PSc0a29vkiw0yYgJbebTsc8/XcCxnxcf3VdrDzGS25mWoadYWamie1ou9lpGdJb6Q7W6w7ky03Vu4PN7PLEz2noxPWVF6IXUjvSP8AV7urgtlbKWfDqeaGiaOacljBHUAuAFhIM3WGwOG/r2rfXJ6ubk4bfWqyDTCjIvzx6ubkv+FZ89VecGSPJ5eM6fwxMJY0ngXeaL9Ddrj3LG2SIbMXCXyTqGTYtir6iZ00jruce5o2NHQFUtbmnb0GHDGKkVhCMwWO23S+ckuGmSd9U5tmRDUYTvleM7dTfxhb8FdzzOZ4nl5aRjjvPf6NX5xW3DZVjkHlGMzezGY7/uxNsO+/cq0xzZZdb2nsuDiI7zvX5RdMMWcyWNjHWLQXO63W1R3X71lkzcs6auE4Cc9JtvXp/dGpdI5QPObcdhWUZKyrX4e9Z1raVV6Z6kT7EghpsNo1iMsj0rLcT2appaO8M0jqT0FGLu2ojPpMt0goOjaaN3oygHg4EeOxB0jpJ4jrx6wPtRuzt1tKhO5SMI0hqaV+tE8tO/p61GmftN9+q9YZyyzNFpqdj/eadUnrFrJ1R7k/J6UvK4Xi0cUbT75cbdhABUTMttceOfNR8Yr3zSOmmk1nuzJyueAAGQC1Wvy93QxcNbJ0rHRWdU61yN5PeqczudvQY68sRHokx5oymX0ZoBSmLDadrhYlmuf3yXfAhdDHGqw8fx14vxF5j1WC62KouoBdAqAQCAQKgEDVIS6Aug41cLZI3RvF2vaWuHFrhY/FJjaa2msxMeT58x7CH0lQ+B/qm7Xe3GT5rh127wVQvWazp63BnrmxxeP8l591i3EuhsIle9Hq7yiDVcfPZZp7PRd4eCvYb81fm8vx/D+xy9O09YeHpDgkj5BzMZc6U6paPVfvJO4WF7rGcfvbbcfGawWpPftH3aHobgzKGm5sODpHHWkdxfuA6AMh2net8RpzZnb3vKlKGS6dYF5PMZYx9DKSRbYyQ7WHoO0d25U81OWdx2d/guJ9pTlt8UKvdaV4hQd46143g9Y+ayi0w12w0t5HOxGTcWjqb+annljHD4/RCmBcbucSeJWE9W6uqxqI0ZzATTLmSsNwp88rYo9rt52NbvcegKa0m06hry5oxV5rNnwaKOmgZDH6LBt3ucc3OPSTmuhWIrGoeZy5bZbzeyU+vAzupalRgc2NstS/IyOdK6+3VPojusFriIrEzKzkmctq46+XSGeVtUZZHSO2uN+rgOwABULW5p29PhxRipFI8kewUNu0XEaYvYA0gEG+a2Y7RWdyp8bhvmx8te7x5KeRu1h6xmPBWovWe0vP5OFzY/irLm2dZq7o2YIO8NUWm7XEdRQegzGXnJ4bIPeAv37UD/KKd/pRujPFp1h3H80C/wCHsd+rnaeh12HxyQc5aSaPa0245Ed4WM1ie7ZTLek7raYc21PFvyWqcFZXsfiuevfUvUwOopjOzyhzmRa132aXEtGerYcdnasI4fUrVvF4mk6rqz6BwnSejqABBUxO4NvquHAajrHwVtw3sa6Bwcmgt0C3UBboBAqgCAQMJWQYXqdIcZJiEHn1Nc8bGqRUtK2+VM1ZIiS3NrgPOaTwO8dGxYXpF46rHD8TfBbdfx6s4q8KlYbc29w4hjvhZVLYbR26u7h8Sw3+L3Z/ZFNPJ+yk+478lr5Lei5GfFPa0fknk8n7KT7jvySKWnyRbiMNe94/KVhVRPDKHsp5XbnDUcAW7xmFvxY71nbl8dxmDJSaRuZ8vk0ON2uA9twbDbcHqI3FWnEQKrGJ4nWc3Wadjh8CNxTYaNKjvaQmxxq9JI5GFkjdZrhYg7wonUxqWVLWpPNXupVaxrXeY4lu6+0dB49aq3xTHZ2+H46mTpfpP7I+stK+NZAayBNZAgkF9vzWdcc2Vc/F48UdZ3PpCz4PjkMDdWNjrn0nH0nH5DoVulYrHRxM/EXzW3b8PUj0mLvRjcVntoSKKeSpN3DViBzH7Rw9W/sg7e7isd7no2zWKV695/Z4mmOIvkdzMcbyxpu4hjiHOGy1hsHxWnNzW6RC/wCHzhx7ve3XyVnmJP2Un8N/5LR7K/o6v8dw/wDu/qPJ5P2Un8N/5J7K/ofx3D/7v6jmJP2Un8N/5J7K/oieO4eP5v6gU026CX7hHxWcYLebRk8UxRHuxMuseESO9Kl1r+00+C30x8rj8TxNs09YiP8APU2TQ1zs2xvYe8eK2aVkCp0Nq2ZtZrjuPcVGh5NVRTxfrIZGjiWG3fsQcWVKDo2YIJVPXPb6LyO1BK/xMu9NjX9NrHvCBC6J3tM8QgQ01/RcD8fFQPUw3SaupbCKplaB6pOsz7rrhSLdhfLDUssJ4I5RvLbxu8LjwTYuGFcq1BLYSGSEn22lzfvMv4qdoXDDsXgnF4Z45B7jwT3bQiU+6BboBQFQF1A5FZoNIQMLUHN0IRLi+lBUjm6hbwUGzDQN4KU7MNAOCBhw8cENolbhGsLtycO49B/NQh4MseZDhYjIgoOQoY3ZFoBRJsuj0Z9RBEk0VhPqeJQR3aHQ+w4dTisZpWe8N2PPkx/DaXM6GQ+/97+y1+wqsR4hmjzj8AaGQ+/97+yewqmfEM3y/B40Og3scet5WcY6x5NF+Jy3+KzrFolANkQ7SSstK6S7BoIml7msY0bXOsAO0pOojcprWbTqsblHZBzvotMcHEjVklHADbGzp2noWPW30b/dxfO37R/y92hw/WA83VjAs0AWuBssNw+KzjorzMzO5TjQonZvkSA8iQHkSA8iQOFEhs8UQ4Ig4UY4IA0A2WQePiOg1FPcyUrNY+s0aju9tk0KviXI5E65gqZIzubIBI3vFnfFRyiqYnyX4lDmyNk7eMTxrW+o+x7rqNIVStppoDqzQyRHhIxzPxDNBzbUqB1bOFI7sqiN6Dp5Rfa0diAu077IHMLmkOa6xGwg2I6iNiDdtCMZmNHGXvc45Zv84m7Gu2n61uxTEC5YfiAky2OG7iOIQTUCoBQGELJBCECWQIQgbZAlkCWQIUDbIEIQQcRw1kwzycNjhtHXxHQiVarqN8J89txueM2/26igbBVEbDccD/3JBOjq2HaCPEIl2aWHY4d6kO5kIEMQ32QcnPYN4PVn8FGxEqqo2OoGg7i+5F/qtIv3qJ+TKOWJ6vIZR68gc9zp5L3aCBqsP+nGMm9Zz6VjFPOerZbPOuWkcsfv+VjocH9aWxO5gzA+sd/Vs61saHq6oRJC0IG6qBCEBYIDJAZIFBCBdYIF1wiCh4QPDwgUSBSCUMeNV7WuHBwDh3FQKvinJ3hdRcmlbG4+tATEb9TfN8FHKKbivIqMzS13U2do/HH/AMVHKKdivJ3idPcmm51o9aBwly+qLO8FGpFamL43ar2OY7g9pae45qA5tSpHeB2s4NBzcQO/eg2vAajVp2N1srXAO4H0QenVsFlED1cOri2ZhBz1gLcQTYjxQX9QFCAQIgQhAmqpQQhA0hAhCBpQcygY4oOEkpCJRZawjcVOhDnxUj1Cey6CvV9Sy92wStPutOr938rKB5oxhwNjDN1iNxHcgmRYoDuP7zHt+IQ27itHD4obMfiIG7wcfghtCqMctsjmd9WJ9u8gIGU+JFx86CfqDLd5KD3qLFtUWZA5vHzTc9Z2lNifHiLj6pUju2pcdyDq15QPBKBbFAhBQNN0DCSgYXFA0vKBhlKBpnKBhqXIGmrcg5urnoOZxJ/Smxzdi7xuKDk7HpB6pUbEHEcYErS2ambK3hIwPH8wQU3FtHqKW5bSSQnjCSB911x8FGh4I0bMbw5nOPA3OZY26xkoFhpKyo2c0/uNlIv2htCGvEsri549FoBDGniSc3FShf45roO7XKEnIEQIUCFSgiBqBpQNKBrggaQgbqDggTmhwCBOZb7IQOELfZHcgXmm+yO5AojHAIF1BwCBNQcAgaYm+yO5Ax0DfZHcg5up2+yESYYG+yFITmhwQJqDggXVCBNVAFqBpagaWhAzVCBCwcEDSwcEDSwcECGMcECc2OCBphbwCBDA32QgTydvshAeSs9kIAUjPYCIObRR+wO5B1ZQx/s29yCVFRx+wO5QJccLRsaEEqNoQdmhQk5B/9k=" id="192" name="Google Shape;192;g95f015ef34_0_0"/>
           <p:cNvSpPr/>
           <p:nvPr/>
         </p:nvSpPr>
@@ -16785,7 +16840,7 @@
       </p:sp>
       <p:sp>
         <p:nvSpPr>
-          <p:cNvPr id="191" name="Google Shape;191;g95f015ef34_0_0"/>
+          <p:cNvPr id="193" name="Google Shape;193;g95f015ef34_0_0"/>
           <p:cNvSpPr txBox="1"/>
           <p:nvPr>
             <p:ph type="title"/>
@@ -16837,12 +16892,12 @@
       </p:sp>
       <p:pic>
         <p:nvPicPr>
-          <p:cNvPr id="192" name="Google Shape;192;g95f015ef34_0_0"/>
+          <p:cNvPr id="194" name="Google Shape;194;g95f015ef34_0_0"/>
           <p:cNvPicPr preferRelativeResize="0"/>
           <p:nvPr/>
         </p:nvPicPr>
         <p:blipFill rotWithShape="1">
-          <a:blip r:embed="rId3">
+          <a:blip r:embed="rId5">
             <a:alphaModFix/>
           </a:blip>
           <a:srcRect b="0" l="0" r="0" t="0"/>
@@ -16864,12 +16919,12 @@
       </p:pic>
       <p:pic>
         <p:nvPicPr>
-          <p:cNvPr descr="https://lh6.googleusercontent.com/xxvaaSD2MDOlP8xszJtDgRSsynerMa9IOBx9sDjvql4fO3dVXv9B5OCGdBifAxFt47aF_xFw5nANy8z8nCQ2gZwQnFUwDnYnANuSWc83nmll6eFj_Sgc8zguozi4IcUOOJPD6hs" id="193" name="Google Shape;193;g95f015ef34_0_0"/>
+          <p:cNvPr descr="https://lh6.googleusercontent.com/xxvaaSD2MDOlP8xszJtDgRSsynerMa9IOBx9sDjvql4fO3dVXv9B5OCGdBifAxFt47aF_xFw5nANy8z8nCQ2gZwQnFUwDnYnANuSWc83nmll6eFj_Sgc8zguozi4IcUOOJPD6hs" id="195" name="Google Shape;195;g95f015ef34_0_0"/>
           <p:cNvPicPr preferRelativeResize="0"/>
           <p:nvPr/>
         </p:nvPicPr>
         <p:blipFill rotWithShape="1">
-          <a:blip r:embed="rId4">
+          <a:blip r:embed="rId6">
             <a:alphaModFix/>
           </a:blip>
           <a:srcRect b="0" l="0" r="0" t="0"/>
@@ -16891,7 +16946,7 @@
       </p:pic>
       <p:sp>
         <p:nvSpPr>
-          <p:cNvPr id="194" name="Google Shape;194;g95f015ef34_0_0"/>
+          <p:cNvPr id="196" name="Google Shape;196;g95f015ef34_0_0"/>
           <p:cNvSpPr txBox="1"/>
           <p:nvPr/>
         </p:nvSpPr>
@@ -16941,12 +16996,12 @@
       </p:sp>
       <p:pic>
         <p:nvPicPr>
-          <p:cNvPr descr="How to Develop a CNN for MNIST Handwritten Digit Classification" id="195" name="Google Shape;195;g95f015ef34_0_0"/>
+          <p:cNvPr descr="How to Develop a CNN for MNIST Handwritten Digit Classification" id="197" name="Google Shape;197;g95f015ef34_0_0"/>
           <p:cNvPicPr preferRelativeResize="0"/>
           <p:nvPr/>
         </p:nvPicPr>
         <p:blipFill rotWithShape="1">
-          <a:blip r:embed="rId5">
+          <a:blip r:embed="rId7">
             <a:alphaModFix/>
           </a:blip>
           <a:srcRect b="0" l="0" r="0" t="0"/>
@@ -16966,116 +17021,6 @@
           </a:ln>
         </p:spPr>
       </p:pic>
-      <p:sp>
-        <p:nvSpPr>
-          <p:cNvPr id="196" name="Google Shape;196;g95f015ef34_0_0"/>
-          <p:cNvSpPr/>
-          <p:nvPr/>
-        </p:nvSpPr>
-        <p:spPr>
-          <a:xfrm>
-            <a:off x="115259" y="629383"/>
-            <a:ext cx="1086600" cy="307800"/>
-          </a:xfrm>
-          <a:prstGeom prst="chevron">
-            <a:avLst>
-              <a:gd fmla="val 34828" name="adj"/>
-            </a:avLst>
-          </a:prstGeom>
-          <a:solidFill>
-            <a:srgbClr val="060202"/>
-          </a:solidFill>
-          <a:ln>
-            <a:noFill/>
-          </a:ln>
-          <a:effectLst>
-            <a:outerShdw blurRad="44450" algn="ctr" dir="5400000" dist="27940">
-              <a:srgbClr val="000000">
-                <a:alpha val="31760"/>
-              </a:srgbClr>
-            </a:outerShdw>
-          </a:effectLst>
-        </p:spPr>
-        <p:txBody>
-          <a:bodyPr anchorCtr="0" anchor="ctr" bIns="45700" lIns="91425" spcFirstLastPara="1" rIns="91425" wrap="square" tIns="45700">
-            <a:noAutofit/>
-          </a:bodyPr>
-          <a:lstStyle/>
-          <a:p>
-            <a:pPr indent="0" lvl="0" marL="0" marR="0" rtl="0" algn="ctr">
-              <a:spcBef>
-                <a:spcPts val="0"/>
-              </a:spcBef>
-              <a:spcAft>
-                <a:spcPts val="0"/>
-              </a:spcAft>
-              <a:buNone/>
-            </a:pPr>
-            <a:r>
-              <a:t/>
-            </a:r>
-            <a:endParaRPr sz="1800">
-              <a:solidFill>
-                <a:srgbClr val="000000"/>
-              </a:solidFill>
-              <a:latin typeface="Calibri"/>
-              <a:ea typeface="Calibri"/>
-              <a:cs typeface="Calibri"/>
-              <a:sym typeface="Calibri"/>
-            </a:endParaRPr>
-          </a:p>
-        </p:txBody>
-      </p:sp>
-      <p:sp>
-        <p:nvSpPr>
-          <p:cNvPr id="197" name="Google Shape;197;g95f015ef34_0_0"/>
-          <p:cNvSpPr txBox="1"/>
-          <p:nvPr/>
-        </p:nvSpPr>
-        <p:spPr>
-          <a:xfrm>
-            <a:off x="49847" y="642488"/>
-            <a:ext cx="1219200" cy="261600"/>
-          </a:xfrm>
-          <a:prstGeom prst="rect">
-            <a:avLst/>
-          </a:prstGeom>
-          <a:noFill/>
-          <a:ln>
-            <a:noFill/>
-          </a:ln>
-        </p:spPr>
-        <p:txBody>
-          <a:bodyPr anchorCtr="0" anchor="t" bIns="45700" lIns="91425" spcFirstLastPara="1" rIns="91425" wrap="square" tIns="45700">
-            <a:noAutofit/>
-          </a:bodyPr>
-          <a:lstStyle/>
-          <a:p>
-            <a:pPr indent="0" lvl="0" marL="0" marR="0" rtl="0" algn="ctr">
-              <a:spcBef>
-                <a:spcPts val="0"/>
-              </a:spcBef>
-              <a:spcAft>
-                <a:spcPts val="0"/>
-              </a:spcAft>
-              <a:buNone/>
-            </a:pPr>
-            <a:r>
-              <a:rPr lang="en-US" sz="1100">
-                <a:solidFill>
-                  <a:schemeClr val="lt1"/>
-                </a:solidFill>
-                <a:latin typeface="Calibri"/>
-                <a:ea typeface="Calibri"/>
-                <a:cs typeface="Calibri"/>
-                <a:sym typeface="Calibri"/>
-              </a:rPr>
-              <a:t>Data Sources</a:t>
-            </a:r>
-            <a:endParaRPr/>
-          </a:p>
-        </p:txBody>
-      </p:sp>
       <p:sp>
         <p:nvSpPr>
           <p:cNvPr id="198" name="Google Shape;198;g95f015ef34_0_0"/>
@@ -17084,8 +17029,8 @@
         </p:nvSpPr>
         <p:spPr>
           <a:xfrm>
-            <a:off x="1647124" y="642489"/>
-            <a:ext cx="1265400" cy="307800"/>
+            <a:off x="115259" y="629383"/>
+            <a:ext cx="1086600" cy="307800"/>
           </a:xfrm>
           <a:prstGeom prst="chevron">
             <a:avLst>
@@ -17093,7 +17038,7 @@
             </a:avLst>
           </a:prstGeom>
           <a:solidFill>
-            <a:srgbClr val="3C1615"/>
+            <a:srgbClr val="060202"/>
           </a:solidFill>
           <a:ln>
             <a:noFill/>
@@ -17144,6 +17089,116 @@
         </p:nvSpPr>
         <p:spPr>
           <a:xfrm>
+            <a:off x="49847" y="642488"/>
+            <a:ext cx="1219200" cy="261600"/>
+          </a:xfrm>
+          <a:prstGeom prst="rect">
+            <a:avLst/>
+          </a:prstGeom>
+          <a:noFill/>
+          <a:ln>
+            <a:noFill/>
+          </a:ln>
+        </p:spPr>
+        <p:txBody>
+          <a:bodyPr anchorCtr="0" anchor="t" bIns="45700" lIns="91425" spcFirstLastPara="1" rIns="91425" wrap="square" tIns="45700">
+            <a:noAutofit/>
+          </a:bodyPr>
+          <a:lstStyle/>
+          <a:p>
+            <a:pPr indent="0" lvl="0" marL="0" marR="0" rtl="0" algn="ctr">
+              <a:spcBef>
+                <a:spcPts val="0"/>
+              </a:spcBef>
+              <a:spcAft>
+                <a:spcPts val="0"/>
+              </a:spcAft>
+              <a:buNone/>
+            </a:pPr>
+            <a:r>
+              <a:rPr lang="en-US" sz="1100">
+                <a:solidFill>
+                  <a:schemeClr val="lt1"/>
+                </a:solidFill>
+                <a:latin typeface="Calibri"/>
+                <a:ea typeface="Calibri"/>
+                <a:cs typeface="Calibri"/>
+                <a:sym typeface="Calibri"/>
+              </a:rPr>
+              <a:t>Data Sources</a:t>
+            </a:r>
+            <a:endParaRPr/>
+          </a:p>
+        </p:txBody>
+      </p:sp>
+      <p:sp>
+        <p:nvSpPr>
+          <p:cNvPr id="200" name="Google Shape;200;g95f015ef34_0_0"/>
+          <p:cNvSpPr/>
+          <p:nvPr/>
+        </p:nvSpPr>
+        <p:spPr>
+          <a:xfrm>
+            <a:off x="1647124" y="642489"/>
+            <a:ext cx="1265400" cy="307800"/>
+          </a:xfrm>
+          <a:prstGeom prst="chevron">
+            <a:avLst>
+              <a:gd fmla="val 34828" name="adj"/>
+            </a:avLst>
+          </a:prstGeom>
+          <a:solidFill>
+            <a:srgbClr val="3C1615"/>
+          </a:solidFill>
+          <a:ln>
+            <a:noFill/>
+          </a:ln>
+          <a:effectLst>
+            <a:outerShdw blurRad="44450" algn="ctr" dir="5400000" dist="27940">
+              <a:srgbClr val="000000">
+                <a:alpha val="31760"/>
+              </a:srgbClr>
+            </a:outerShdw>
+          </a:effectLst>
+        </p:spPr>
+        <p:txBody>
+          <a:bodyPr anchorCtr="0" anchor="ctr" bIns="45700" lIns="91425" spcFirstLastPara="1" rIns="91425" wrap="square" tIns="45700">
+            <a:noAutofit/>
+          </a:bodyPr>
+          <a:lstStyle/>
+          <a:p>
+            <a:pPr indent="0" lvl="0" marL="0" marR="0" rtl="0" algn="ctr">
+              <a:spcBef>
+                <a:spcPts val="0"/>
+              </a:spcBef>
+              <a:spcAft>
+                <a:spcPts val="0"/>
+              </a:spcAft>
+              <a:buNone/>
+            </a:pPr>
+            <a:r>
+              <a:t/>
+            </a:r>
+            <a:endParaRPr sz="1800">
+              <a:solidFill>
+                <a:srgbClr val="000000"/>
+              </a:solidFill>
+              <a:latin typeface="Calibri"/>
+              <a:ea typeface="Calibri"/>
+              <a:cs typeface="Calibri"/>
+              <a:sym typeface="Calibri"/>
+            </a:endParaRPr>
+          </a:p>
+        </p:txBody>
+      </p:sp>
+      <p:sp>
+        <p:nvSpPr>
+          <p:cNvPr id="201" name="Google Shape;201;g95f015ef34_0_0"/>
+          <p:cNvSpPr txBox="1"/>
+          <p:nvPr/>
+        </p:nvSpPr>
+        <p:spPr>
+          <a:xfrm>
             <a:off x="1728962" y="642488"/>
             <a:ext cx="1140900" cy="261600"/>
           </a:xfrm>
@@ -17188,7 +17243,7 @@
       </p:sp>
       <p:sp>
         <p:nvSpPr>
-          <p:cNvPr id="200" name="Google Shape;200;g95f015ef34_0_0"/>
+          <p:cNvPr id="202" name="Google Shape;202;g95f015ef34_0_0"/>
           <p:cNvSpPr/>
           <p:nvPr/>
         </p:nvSpPr>
@@ -17251,10 +17306,10 @@
       </p:sp>
       <p:cxnSp>
         <p:nvCxnSpPr>
-          <p:cNvPr id="201" name="Google Shape;201;g95f015ef34_0_0"/>
+          <p:cNvPr id="203" name="Google Shape;203;g95f015ef34_0_0"/>
           <p:cNvCxnSpPr>
-            <a:stCxn id="195" idx="3"/>
-            <a:endCxn id="202" idx="1"/>
+            <a:stCxn id="197" idx="3"/>
+            <a:endCxn id="204" idx="1"/>
           </p:cNvCxnSpPr>
           <p:nvPr/>
         </p:nvCxnSpPr>
@@ -17280,10 +17335,10 @@
       </p:cxnSp>
       <p:cxnSp>
         <p:nvCxnSpPr>
-          <p:cNvPr id="203" name="Google Shape;203;g95f015ef34_0_0"/>
+          <p:cNvPr id="205" name="Google Shape;205;g95f015ef34_0_0"/>
           <p:cNvCxnSpPr>
-            <a:stCxn id="193" idx="3"/>
-            <a:endCxn id="200" idx="1"/>
+            <a:stCxn id="195" idx="3"/>
+            <a:endCxn id="202" idx="1"/>
           </p:cNvCxnSpPr>
           <p:nvPr/>
         </p:nvCxnSpPr>
@@ -17309,7 +17364,7 @@
       </p:cxnSp>
       <p:sp>
         <p:nvSpPr>
-          <p:cNvPr id="202" name="Google Shape;202;g95f015ef34_0_0"/>
+          <p:cNvPr id="204" name="Google Shape;204;g95f015ef34_0_0"/>
           <p:cNvSpPr/>
           <p:nvPr/>
         </p:nvSpPr>
@@ -17378,7 +17433,7 @@
       </p:sp>
       <p:sp>
         <p:nvSpPr>
-          <p:cNvPr id="204" name="Google Shape;204;g95f015ef34_0_0"/>
+          <p:cNvPr id="206" name="Google Shape;206;g95f015ef34_0_0"/>
           <p:cNvSpPr/>
           <p:nvPr/>
         </p:nvSpPr>
@@ -17438,7 +17493,7 @@
       </p:sp>
       <p:sp>
         <p:nvSpPr>
-          <p:cNvPr id="205" name="Google Shape;205;g95f015ef34_0_0"/>
+          <p:cNvPr id="207" name="Google Shape;207;g95f015ef34_0_0"/>
           <p:cNvSpPr txBox="1"/>
           <p:nvPr/>
         </p:nvSpPr>
@@ -17488,12 +17543,12 @@
       </p:sp>
       <p:pic>
         <p:nvPicPr>
-          <p:cNvPr id="206" name="Google Shape;206;g95f015ef34_0_0"/>
+          <p:cNvPr id="208" name="Google Shape;208;g95f015ef34_0_0"/>
           <p:cNvPicPr preferRelativeResize="0"/>
           <p:nvPr/>
         </p:nvPicPr>
         <p:blipFill rotWithShape="1">
-          <a:blip r:embed="rId6">
+          <a:blip r:embed="rId8">
             <a:alphaModFix/>
           </a:blip>
           <a:srcRect b="0" l="0" r="0" t="0"/>
@@ -17515,7 +17570,7 @@
       </p:pic>
       <p:sp>
         <p:nvSpPr>
-          <p:cNvPr id="207" name="Google Shape;207;g95f015ef34_0_0"/>
+          <p:cNvPr id="209" name="Google Shape;209;g95f015ef34_0_0"/>
           <p:cNvSpPr txBox="1"/>
           <p:nvPr/>
         </p:nvSpPr>
@@ -17573,7 +17628,7 @@
       </p:sp>
       <p:sp>
         <p:nvSpPr>
-          <p:cNvPr id="208" name="Google Shape;208;g95f015ef34_0_0"/>
+          <p:cNvPr id="210" name="Google Shape;210;g95f015ef34_0_0"/>
           <p:cNvSpPr txBox="1"/>
           <p:nvPr/>
         </p:nvSpPr>
@@ -17623,7 +17678,7 @@
       </p:sp>
       <p:sp>
         <p:nvSpPr>
-          <p:cNvPr id="209" name="Google Shape;209;g95f015ef34_0_0"/>
+          <p:cNvPr id="211" name="Google Shape;211;g95f015ef34_0_0"/>
           <p:cNvSpPr/>
           <p:nvPr/>
         </p:nvSpPr>
@@ -17683,7 +17738,7 @@
       </p:sp>
       <p:sp>
         <p:nvSpPr>
-          <p:cNvPr id="210" name="Google Shape;210;g95f015ef34_0_0"/>
+          <p:cNvPr id="212" name="Google Shape;212;g95f015ef34_0_0"/>
           <p:cNvSpPr txBox="1"/>
           <p:nvPr/>
         </p:nvSpPr>
@@ -17733,12 +17788,12 @@
       </p:sp>
       <p:pic>
         <p:nvPicPr>
-          <p:cNvPr descr="http://www.geeks3d.com/public/common/python-logo.jpg" id="211" name="Google Shape;211;g95f015ef34_0_0"/>
+          <p:cNvPr descr="http://www.geeks3d.com/public/common/python-logo.jpg" id="213" name="Google Shape;213;g95f015ef34_0_0"/>
           <p:cNvPicPr preferRelativeResize="0"/>
           <p:nvPr/>
         </p:nvPicPr>
         <p:blipFill rotWithShape="1">
-          <a:blip r:embed="rId7">
+          <a:blip r:embed="rId9">
             <a:alphaModFix/>
           </a:blip>
           <a:srcRect b="0" l="0" r="0" t="0"/>
@@ -17760,10 +17815,10 @@
       </p:pic>
       <p:cxnSp>
         <p:nvCxnSpPr>
-          <p:cNvPr id="212" name="Google Shape;212;g95f015ef34_0_0"/>
+          <p:cNvPr id="214" name="Google Shape;214;g95f015ef34_0_0"/>
           <p:cNvCxnSpPr>
-            <a:stCxn id="202" idx="3"/>
-            <a:endCxn id="213" idx="1"/>
+            <a:stCxn id="204" idx="3"/>
+            <a:endCxn id="215" idx="1"/>
           </p:cNvCxnSpPr>
           <p:nvPr/>
         </p:nvCxnSpPr>
@@ -17789,10 +17844,10 @@
       </p:cxnSp>
       <p:cxnSp>
         <p:nvCxnSpPr>
-          <p:cNvPr id="214" name="Google Shape;214;g95f015ef34_0_0"/>
+          <p:cNvPr id="216" name="Google Shape;216;g95f015ef34_0_0"/>
           <p:cNvCxnSpPr>
-            <a:stCxn id="200" idx="3"/>
-            <a:endCxn id="215" idx="1"/>
+            <a:stCxn id="202" idx="3"/>
+            <a:endCxn id="217" idx="1"/>
           </p:cNvCxnSpPr>
           <p:nvPr/>
         </p:nvCxnSpPr>
@@ -17818,12 +17873,12 @@
       </p:cxnSp>
       <p:pic>
         <p:nvPicPr>
-          <p:cNvPr descr="Apache Spark - Wikipedia" id="216" name="Google Shape;216;g95f015ef34_0_0"/>
+          <p:cNvPr descr="Apache Spark - Wikipedia" id="218" name="Google Shape;218;g95f015ef34_0_0"/>
           <p:cNvPicPr preferRelativeResize="0"/>
           <p:nvPr/>
         </p:nvPicPr>
         <p:blipFill rotWithShape="1">
-          <a:blip r:embed="rId8">
+          <a:blip r:embed="rId10">
             <a:alphaModFix/>
           </a:blip>
           <a:srcRect b="0" l="0" r="0" t="0"/>
@@ -17845,7 +17900,7 @@
       </p:pic>
       <p:sp>
         <p:nvSpPr>
-          <p:cNvPr id="217" name="Google Shape;217;g95f015ef34_0_0"/>
+          <p:cNvPr id="219" name="Google Shape;219;g95f015ef34_0_0"/>
           <p:cNvSpPr/>
           <p:nvPr/>
         </p:nvSpPr>
@@ -17925,9 +17980,9 @@
       </p:sp>
       <p:cxnSp>
         <p:nvCxnSpPr>
-          <p:cNvPr id="218" name="Google Shape;218;g95f015ef34_0_0"/>
+          <p:cNvPr id="220" name="Google Shape;220;g95f015ef34_0_0"/>
           <p:cNvCxnSpPr>
-            <a:stCxn id="207" idx="3"/>
+            <a:stCxn id="209" idx="3"/>
           </p:cNvCxnSpPr>
           <p:nvPr/>
         </p:nvCxnSpPr>
@@ -17953,12 +18008,12 @@
       </p:cxnSp>
       <p:pic>
         <p:nvPicPr>
-          <p:cNvPr id="219" name="Google Shape;219;g95f015ef34_0_0"/>
+          <p:cNvPr id="221" name="Google Shape;221;g95f015ef34_0_0"/>
           <p:cNvPicPr preferRelativeResize="0"/>
           <p:nvPr/>
         </p:nvPicPr>
         <p:blipFill rotWithShape="1">
-          <a:blip r:embed="rId9">
+          <a:blip r:embed="rId11">
             <a:alphaModFix/>
           </a:blip>
           <a:srcRect b="0" l="0" r="0" t="0"/>
@@ -17980,7 +18035,7 @@
       </p:pic>
       <p:sp>
         <p:nvSpPr>
-          <p:cNvPr id="220" name="Google Shape;220;g95f015ef34_0_0"/>
+          <p:cNvPr id="222" name="Google Shape;222;g95f015ef34_0_0"/>
           <p:cNvSpPr txBox="1"/>
           <p:nvPr/>
         </p:nvSpPr>
@@ -18035,7 +18090,7 @@
       </p:sp>
       <p:sp>
         <p:nvSpPr>
-          <p:cNvPr id="221" name="Google Shape;221;g95f015ef34_0_0"/>
+          <p:cNvPr id="223" name="Google Shape;223;g95f015ef34_0_0"/>
           <p:cNvSpPr txBox="1"/>
           <p:nvPr/>
         </p:nvSpPr>
@@ -18085,7 +18140,7 @@
       </p:sp>
       <p:cxnSp>
         <p:nvCxnSpPr>
-          <p:cNvPr id="222" name="Google Shape;222;g95f015ef34_0_0"/>
+          <p:cNvPr id="224" name="Google Shape;224;g95f015ef34_0_0"/>
           <p:cNvCxnSpPr/>
           <p:nvPr/>
         </p:nvCxnSpPr>
@@ -18111,7 +18166,7 @@
       </p:cxnSp>
       <p:sp>
         <p:nvSpPr>
-          <p:cNvPr id="213" name="Google Shape;213;g95f015ef34_0_0"/>
+          <p:cNvPr id="215" name="Google Shape;215;g95f015ef34_0_0"/>
           <p:cNvSpPr txBox="1"/>
           <p:nvPr/>
         </p:nvSpPr>
@@ -18161,7 +18216,7 @@
       </p:sp>
       <p:sp>
         <p:nvSpPr>
-          <p:cNvPr id="215" name="Google Shape;215;g95f015ef34_0_0"/>
+          <p:cNvPr id="217" name="Google Shape;217;g95f015ef34_0_0"/>
           <p:cNvSpPr txBox="1"/>
           <p:nvPr/>
         </p:nvSpPr>
@@ -18211,7 +18266,7 @@
       </p:sp>
       <p:sp>
         <p:nvSpPr>
-          <p:cNvPr id="223" name="Google Shape;223;g95f015ef34_0_0"/>
+          <p:cNvPr id="225" name="Google Shape;225;g95f015ef34_0_0"/>
           <p:cNvSpPr/>
           <p:nvPr/>
         </p:nvSpPr>
@@ -18282,10 +18337,10 @@
       </p:sp>
       <p:cxnSp>
         <p:nvCxnSpPr>
-          <p:cNvPr id="224" name="Google Shape;224;g95f015ef34_0_0"/>
+          <p:cNvPr id="226" name="Google Shape;226;g95f015ef34_0_0"/>
           <p:cNvCxnSpPr>
-            <a:stCxn id="213" idx="3"/>
-            <a:endCxn id="223" idx="2"/>
+            <a:stCxn id="215" idx="3"/>
+            <a:endCxn id="225" idx="2"/>
           </p:cNvCxnSpPr>
           <p:nvPr/>
         </p:nvCxnSpPr>
@@ -18311,7 +18366,7 @@
       </p:cxnSp>
       <p:sp>
         <p:nvSpPr>
-          <p:cNvPr id="225" name="Google Shape;225;g95f015ef34_0_0"/>
+          <p:cNvPr id="227" name="Google Shape;227;g95f015ef34_0_0"/>
           <p:cNvSpPr/>
           <p:nvPr/>
         </p:nvSpPr>
@@ -18383,12 +18438,12 @@
       </p:sp>
       <p:pic>
         <p:nvPicPr>
-          <p:cNvPr id="226" name="Google Shape;226;g95f015ef34_0_0"/>
+          <p:cNvPr id="228" name="Google Shape;228;g95f015ef34_0_0"/>
           <p:cNvPicPr preferRelativeResize="0"/>
           <p:nvPr/>
         </p:nvPicPr>
         <p:blipFill rotWithShape="1">
-          <a:blip r:embed="rId10">
+          <a:blip r:embed="rId12">
             <a:alphaModFix/>
           </a:blip>
           <a:srcRect b="0" l="0" r="0" t="0"/>
@@ -18410,7 +18465,7 @@
       </p:pic>
       <p:sp>
         <p:nvSpPr>
-          <p:cNvPr id="227" name="Google Shape;227;g95f015ef34_0_0"/>
+          <p:cNvPr id="229" name="Google Shape;229;g95f015ef34_0_0"/>
           <p:cNvSpPr txBox="1"/>
           <p:nvPr/>
         </p:nvSpPr>
@@ -18465,7 +18520,7 @@
       </p:sp>
       <p:sp>
         <p:nvSpPr>
-          <p:cNvPr id="228" name="Google Shape;228;g95f015ef34_0_0"/>
+          <p:cNvPr id="230" name="Google Shape;230;g95f015ef34_0_0"/>
           <p:cNvSpPr txBox="1"/>
           <p:nvPr/>
         </p:nvSpPr>
@@ -18515,7 +18570,7 @@
       </p:sp>
       <p:sp>
         <p:nvSpPr>
-          <p:cNvPr id="229" name="Google Shape;229;g95f015ef34_0_0"/>
+          <p:cNvPr id="231" name="Google Shape;231;g95f015ef34_0_0"/>
           <p:cNvSpPr txBox="1"/>
           <p:nvPr/>
         </p:nvSpPr>
@@ -18565,9 +18620,9 @@
       </p:sp>
       <p:cxnSp>
         <p:nvCxnSpPr>
-          <p:cNvPr id="230" name="Google Shape;230;g95f015ef34_0_0"/>
+          <p:cNvPr id="232" name="Google Shape;232;g95f015ef34_0_0"/>
           <p:cNvCxnSpPr>
-            <a:stCxn id="228" idx="3"/>
+            <a:stCxn id="230" idx="3"/>
           </p:cNvCxnSpPr>
           <p:nvPr/>
         </p:nvCxnSpPr>
@@ -18593,9 +18648,9 @@
       </p:cxnSp>
       <p:cxnSp>
         <p:nvCxnSpPr>
-          <p:cNvPr id="231" name="Google Shape;231;g95f015ef34_0_0"/>
+          <p:cNvPr id="233" name="Google Shape;233;g95f015ef34_0_0"/>
           <p:cNvCxnSpPr>
-            <a:stCxn id="229" idx="3"/>
+            <a:stCxn id="231" idx="3"/>
           </p:cNvCxnSpPr>
           <p:nvPr/>
         </p:nvCxnSpPr>
@@ -18621,7 +18676,7 @@
       </p:cxnSp>
       <p:sp>
         <p:nvSpPr>
-          <p:cNvPr id="232" name="Google Shape;232;g95f015ef34_0_0"/>
+          <p:cNvPr id="234" name="Google Shape;234;g95f015ef34_0_0"/>
           <p:cNvSpPr/>
           <p:nvPr/>
         </p:nvSpPr>
@@ -18681,7 +18736,7 @@
       </p:sp>
       <p:sp>
         <p:nvSpPr>
-          <p:cNvPr id="233" name="Google Shape;233;g95f015ef34_0_0"/>
+          <p:cNvPr id="235" name="Google Shape;235;g95f015ef34_0_0"/>
           <p:cNvSpPr txBox="1"/>
           <p:nvPr/>
         </p:nvSpPr>
@@ -18731,7 +18786,7 @@
       </p:sp>
       <p:sp>
         <p:nvSpPr>
-          <p:cNvPr id="234" name="Google Shape;234;g95f015ef34_0_0"/>
+          <p:cNvPr id="236" name="Google Shape;236;g95f015ef34_0_0"/>
           <p:cNvSpPr/>
           <p:nvPr/>
         </p:nvSpPr>
@@ -18799,9 +18854,9 @@
       </p:sp>
       <p:cxnSp>
         <p:nvCxnSpPr>
-          <p:cNvPr id="235" name="Google Shape;235;g95f015ef34_0_0"/>
+          <p:cNvPr id="237" name="Google Shape;237;g95f015ef34_0_0"/>
           <p:cNvCxnSpPr>
-            <a:endCxn id="234" idx="2"/>
+            <a:endCxn id="236" idx="2"/>
           </p:cNvCxnSpPr>
           <p:nvPr/>
         </p:nvCxnSpPr>
@@ -18827,7 +18882,7 @@
       </p:cxnSp>
       <p:sp>
         <p:nvSpPr>
-          <p:cNvPr id="236" name="Google Shape;236;g95f015ef34_0_0"/>
+          <p:cNvPr id="238" name="Google Shape;238;g95f015ef34_0_0"/>
           <p:cNvSpPr/>
           <p:nvPr/>
         </p:nvSpPr>
@@ -18906,7 +18961,7 @@
       </p:sp>
       <p:sp>
         <p:nvSpPr>
-          <p:cNvPr id="237" name="Google Shape;237;g95f015ef34_0_0"/>
+          <p:cNvPr id="239" name="Google Shape;239;g95f015ef34_0_0"/>
           <p:cNvSpPr/>
           <p:nvPr/>
         </p:nvSpPr>
@@ -18966,7 +19021,7 @@
       </p:sp>
       <p:sp>
         <p:nvSpPr>
-          <p:cNvPr id="238" name="Google Shape;238;g95f015ef34_0_0"/>
+          <p:cNvPr id="240" name="Google Shape;240;g95f015ef34_0_0"/>
           <p:cNvSpPr txBox="1"/>
           <p:nvPr/>
         </p:nvSpPr>
@@ -19016,17 +19071,14 @@
       </p:sp>
       <p:cxnSp>
         <p:nvCxnSpPr>
-          <p:cNvPr id="239" name="Google Shape;239;g95f015ef34_0_0"/>
-          <p:cNvCxnSpPr>
-            <a:stCxn id="234" idx="4"/>
-            <a:endCxn id="187" idx="1"/>
-          </p:cNvCxnSpPr>
+          <p:cNvPr id="241" name="Google Shape;241;g95f015ef34_0_0"/>
+          <p:cNvCxnSpPr/>
           <p:nvPr/>
         </p:nvCxnSpPr>
         <p:spPr>
           <a:xfrm>
-            <a:off x="8796983" y="1893727"/>
-            <a:ext cx="665400" cy="171000"/>
+            <a:off x="8819150" y="1925050"/>
+            <a:ext cx="818100" cy="12000"/>
           </a:xfrm>
           <a:prstGeom prst="straightConnector1">
             <a:avLst/>
@@ -19045,133 +19097,14 @@
       </p:cxnSp>
       <p:sp>
         <p:nvSpPr>
-          <p:cNvPr id="240" name="Google Shape;240;g95f015ef34_0_0"/>
-          <p:cNvSpPr txBox="1"/>
-          <p:nvPr/>
-        </p:nvSpPr>
-        <p:spPr>
-          <a:xfrm>
-            <a:off x="7804876" y="2308386"/>
-            <a:ext cx="954000" cy="461700"/>
-          </a:xfrm>
-          <a:prstGeom prst="rect">
-            <a:avLst/>
-          </a:prstGeom>
-          <a:noFill/>
-          <a:ln>
-            <a:noFill/>
-          </a:ln>
-        </p:spPr>
-        <p:txBody>
-          <a:bodyPr anchorCtr="0" anchor="t" bIns="45700" lIns="91425" spcFirstLastPara="1" rIns="91425" wrap="square" tIns="45700">
-            <a:noAutofit/>
-          </a:bodyPr>
-          <a:lstStyle/>
-          <a:p>
-            <a:pPr indent="0" lvl="0" marL="0" marR="0" rtl="0" algn="ctr">
-              <a:spcBef>
-                <a:spcPts val="0"/>
-              </a:spcBef>
-              <a:spcAft>
-                <a:spcPts val="0"/>
-              </a:spcAft>
-              <a:buNone/>
-            </a:pPr>
-            <a:r>
-              <a:rPr lang="en-US" sz="1200">
-                <a:solidFill>
-                  <a:schemeClr val="dk1"/>
-                </a:solidFill>
-                <a:latin typeface="Calibri"/>
-                <a:ea typeface="Calibri"/>
-                <a:cs typeface="Calibri"/>
-                <a:sym typeface="Calibri"/>
-              </a:rPr>
-              <a:t>Model Deployment</a:t>
-            </a:r>
-            <a:endParaRPr/>
-          </a:p>
-        </p:txBody>
-      </p:sp>
-      <p:sp>
-        <p:nvSpPr>
-          <p:cNvPr id="241" name="Google Shape;241;g95f015ef34_0_0"/>
-          <p:cNvSpPr/>
-          <p:nvPr/>
-        </p:nvSpPr>
-        <p:spPr>
-          <a:xfrm>
-            <a:off x="9876171" y="1974318"/>
-            <a:ext cx="1513800" cy="591000"/>
-          </a:xfrm>
-          <a:prstGeom prst="rect">
-            <a:avLst/>
-          </a:prstGeom>
-          <a:gradFill>
-            <a:gsLst>
-              <a:gs pos="0">
-                <a:srgbClr val="7FB75F"/>
-              </a:gs>
-              <a:gs pos="50000">
-                <a:srgbClr val="6EB141"/>
-              </a:gs>
-              <a:gs pos="100000">
-                <a:srgbClr val="5FA134"/>
-              </a:gs>
-            </a:gsLst>
-            <a:lin ang="5400012" scaled="0"/>
-          </a:gradFill>
-          <a:ln cap="flat" cmpd="sng" w="9525">
-            <a:solidFill>
-              <a:schemeClr val="accent6"/>
-            </a:solidFill>
-            <a:prstDash val="solid"/>
-            <a:miter lim="800000"/>
-            <a:headEnd len="sm" w="sm" type="none"/>
-            <a:tailEnd len="sm" w="sm" type="none"/>
-          </a:ln>
-        </p:spPr>
-        <p:txBody>
-          <a:bodyPr anchorCtr="0" anchor="ctr" bIns="45700" lIns="91425" spcFirstLastPara="1" rIns="91425" wrap="square" tIns="45700">
-            <a:noAutofit/>
-          </a:bodyPr>
-          <a:lstStyle/>
-          <a:p>
-            <a:pPr indent="0" lvl="0" marL="0" marR="0" rtl="0" algn="ctr">
-              <a:spcBef>
-                <a:spcPts val="0"/>
-              </a:spcBef>
-              <a:spcAft>
-                <a:spcPts val="0"/>
-              </a:spcAft>
-              <a:buNone/>
-            </a:pPr>
-            <a:r>
-              <a:rPr lang="en-US" sz="1400">
-                <a:solidFill>
-                  <a:schemeClr val="lt1"/>
-                </a:solidFill>
-                <a:latin typeface="Calibri"/>
-                <a:ea typeface="Calibri"/>
-                <a:cs typeface="Calibri"/>
-                <a:sym typeface="Calibri"/>
-              </a:rPr>
-              <a:t>Model Inference</a:t>
-            </a:r>
-            <a:endParaRPr/>
-          </a:p>
-        </p:txBody>
-      </p:sp>
-      <p:sp>
-        <p:nvSpPr>
           <p:cNvPr id="242" name="Google Shape;242;g95f015ef34_0_0"/>
           <p:cNvSpPr txBox="1"/>
           <p:nvPr/>
         </p:nvSpPr>
         <p:spPr>
           <a:xfrm>
-            <a:off x="9743476" y="1498225"/>
-            <a:ext cx="1586100" cy="307800"/>
+            <a:off x="9690975" y="1370938"/>
+            <a:ext cx="1883400" cy="307800"/>
           </a:xfrm>
           <a:prstGeom prst="rect">
             <a:avLst/>
@@ -19206,7 +19139,7 @@
                 <a:cs typeface="Calibri"/>
                 <a:sym typeface="Calibri"/>
               </a:rPr>
-              <a:t>Inference Layer</a:t>
+              <a:t>Model Inference Layer</a:t>
             </a:r>
             <a:endParaRPr b="1"/>
           </a:p>
@@ -19219,7 +19152,7 @@
           <p:nvPr/>
         </p:nvPicPr>
         <p:blipFill rotWithShape="1">
-          <a:blip r:embed="rId7">
+          <a:blip r:embed="rId9">
             <a:alphaModFix/>
           </a:blip>
           <a:srcRect b="0" l="0" r="0" t="0"/>
@@ -19246,7 +19179,7 @@
           <p:nvPr/>
         </p:nvPicPr>
         <p:blipFill>
-          <a:blip r:embed="rId11">
+          <a:blip r:embed="rId13">
             <a:alphaModFix/>
           </a:blip>
           <a:stretch>
@@ -19414,7 +19347,7 @@
           <p:cNvPr id="248" name="Google Shape;248;g95f015ef34_0_0"/>
           <p:cNvCxnSpPr>
             <a:stCxn id="246" idx="0"/>
-            <a:endCxn id="236" idx="3"/>
+            <a:endCxn id="238" idx="3"/>
           </p:cNvCxnSpPr>
           <p:nvPr/>
         </p:nvCxnSpPr>
@@ -19443,7 +19376,7 @@
           <p:cNvPr id="249" name="Google Shape;249;g95f015ef34_0_0"/>
           <p:cNvCxnSpPr>
             <a:stCxn id="246" idx="1"/>
-            <a:endCxn id="208" idx="2"/>
+            <a:endCxn id="210" idx="2"/>
           </p:cNvCxnSpPr>
           <p:nvPr/>
         </p:nvCxnSpPr>
@@ -19478,8 +19411,8 @@
         </p:nvSpPr>
         <p:spPr>
           <a:xfrm>
-            <a:off x="9462549" y="4054175"/>
-            <a:ext cx="2218800" cy="2144100"/>
+            <a:off x="9630272" y="4054175"/>
+            <a:ext cx="2051100" cy="2144100"/>
           </a:xfrm>
           <a:prstGeom prst="rect">
             <a:avLst/>
@@ -19537,8 +19470,8 @@
         </p:nvSpPr>
         <p:spPr>
           <a:xfrm>
-            <a:off x="9745369" y="4125750"/>
-            <a:ext cx="1586100" cy="307800"/>
+            <a:off x="9745376" y="4125750"/>
+            <a:ext cx="1883400" cy="307800"/>
           </a:xfrm>
           <a:prstGeom prst="rect">
             <a:avLst/>
@@ -19586,7 +19519,7 @@
           <p:nvPr/>
         </p:nvPicPr>
         <p:blipFill>
-          <a:blip r:embed="rId12">
+          <a:blip r:embed="rId14">
             <a:alphaModFix/>
           </a:blip>
           <a:stretch>
@@ -19595,8 +19528,8 @@
         </p:blipFill>
         <p:spPr>
           <a:xfrm>
-            <a:off x="10001475" y="5678375"/>
-            <a:ext cx="1140900" cy="487476"/>
+            <a:off x="10224900" y="4616013"/>
+            <a:ext cx="879900" cy="879900"/>
           </a:xfrm>
           <a:prstGeom prst="rect">
             <a:avLst/>
@@ -19607,47 +19540,19 @@
           </a:ln>
         </p:spPr>
       </p:pic>
-      <p:pic>
-        <p:nvPicPr>
-          <p:cNvPr id="253" name="Google Shape;253;g95f015ef34_0_0"/>
-          <p:cNvPicPr preferRelativeResize="0"/>
-          <p:nvPr/>
-        </p:nvPicPr>
-        <p:blipFill>
-          <a:blip r:embed="rId13">
-            <a:alphaModFix/>
-          </a:blip>
-          <a:stretch>
-            <a:fillRect/>
-          </a:stretch>
-        </p:blipFill>
-        <p:spPr>
-          <a:xfrm>
-            <a:off x="10148700" y="4616013"/>
-            <a:ext cx="879900" cy="879900"/>
-          </a:xfrm>
-          <a:prstGeom prst="rect">
-            <a:avLst/>
-          </a:prstGeom>
-          <a:noFill/>
-          <a:ln>
-            <a:noFill/>
-          </a:ln>
-        </p:spPr>
-      </p:pic>
       <p:cxnSp>
         <p:nvCxnSpPr>
-          <p:cNvPr id="254" name="Google Shape;254;g95f015ef34_0_0"/>
+          <p:cNvPr id="253" name="Google Shape;253;g95f015ef34_0_0"/>
           <p:cNvCxnSpPr>
-            <a:stCxn id="187" idx="2"/>
+            <a:stCxn id="189" idx="2"/>
             <a:endCxn id="250" idx="0"/>
           </p:cNvCxnSpPr>
           <p:nvPr/>
         </p:nvCxnSpPr>
         <p:spPr>
           <a:xfrm>
-            <a:off x="10571925" y="2782375"/>
-            <a:ext cx="0" cy="1271700"/>
+            <a:off x="10655800" y="3174475"/>
+            <a:ext cx="0" cy="879600"/>
           </a:xfrm>
           <a:prstGeom prst="straightConnector1">
             <a:avLst/>
@@ -19666,35 +19571,7 @@
       </p:cxnSp>
       <p:pic>
         <p:nvPicPr>
-          <p:cNvPr id="255" name="Google Shape;255;g95f015ef34_0_0"/>
-          <p:cNvPicPr preferRelativeResize="0"/>
-          <p:nvPr/>
-        </p:nvPicPr>
-        <p:blipFill>
-          <a:blip r:embed="rId14">
-            <a:alphaModFix/>
-          </a:blip>
-          <a:stretch>
-            <a:fillRect/>
-          </a:stretch>
-        </p:blipFill>
-        <p:spPr>
-          <a:xfrm>
-            <a:off x="3331576" y="1873"/>
-            <a:ext cx="612850" cy="612831"/>
-          </a:xfrm>
-          <a:prstGeom prst="rect">
-            <a:avLst/>
-          </a:prstGeom>
-          <a:noFill/>
-          <a:ln>
-            <a:noFill/>
-          </a:ln>
-        </p:spPr>
-      </p:pic>
-      <p:pic>
-        <p:nvPicPr>
-          <p:cNvPr id="256" name="Google Shape;256;g95f015ef34_0_0"/>
+          <p:cNvPr id="254" name="Google Shape;254;g95f015ef34_0_0"/>
           <p:cNvPicPr preferRelativeResize="0"/>
           <p:nvPr/>
         </p:nvPicPr>
@@ -19708,8 +19585,8 @@
         </p:blipFill>
         <p:spPr>
           <a:xfrm>
-            <a:off x="10571932" y="169576"/>
-            <a:ext cx="785718" cy="439500"/>
+            <a:off x="3331576" y="1873"/>
+            <a:ext cx="612850" cy="612831"/>
           </a:xfrm>
           <a:prstGeom prst="rect">
             <a:avLst/>
@@ -19720,19 +19597,47 @@
           </a:ln>
         </p:spPr>
       </p:pic>
+      <p:pic>
+        <p:nvPicPr>
+          <p:cNvPr id="255" name="Google Shape;255;g95f015ef34_0_0"/>
+          <p:cNvPicPr preferRelativeResize="0"/>
+          <p:nvPr/>
+        </p:nvPicPr>
+        <p:blipFill>
+          <a:blip r:embed="rId16">
+            <a:alphaModFix/>
+          </a:blip>
+          <a:stretch>
+            <a:fillRect/>
+          </a:stretch>
+        </p:blipFill>
+        <p:spPr>
+          <a:xfrm>
+            <a:off x="10391690" y="2785738"/>
+            <a:ext cx="546300" cy="305576"/>
+          </a:xfrm>
+          <a:prstGeom prst="rect">
+            <a:avLst/>
+          </a:prstGeom>
+          <a:noFill/>
+          <a:ln>
+            <a:noFill/>
+          </a:ln>
+        </p:spPr>
+      </p:pic>
       <p:cxnSp>
         <p:nvCxnSpPr>
-          <p:cNvPr id="257" name="Google Shape;257;g95f015ef34_0_0"/>
+          <p:cNvPr id="256" name="Google Shape;256;g95f015ef34_0_0"/>
           <p:cNvCxnSpPr>
             <a:stCxn id="250" idx="1"/>
-            <a:endCxn id="236" idx="4"/>
+            <a:endCxn id="238" idx="4"/>
           </p:cNvCxnSpPr>
           <p:nvPr/>
         </p:nvCxnSpPr>
         <p:spPr>
           <a:xfrm rot="10800000">
-            <a:off x="8798049" y="3690725"/>
-            <a:ext cx="664500" cy="1435500"/>
+            <a:off x="8798072" y="3690725"/>
+            <a:ext cx="832200" cy="1435500"/>
           </a:xfrm>
           <a:prstGeom prst="straightConnector1">
             <a:avLst/>
@@ -19751,7 +19656,7 @@
       </p:cxnSp>
       <p:sp>
         <p:nvSpPr>
-          <p:cNvPr id="258" name="Google Shape;258;g95f015ef34_0_0"/>
+          <p:cNvPr id="257" name="Google Shape;257;g95f015ef34_0_0"/>
           <p:cNvSpPr/>
           <p:nvPr/>
         </p:nvSpPr>
@@ -19796,14 +19701,14 @@
       </p:sp>
       <p:sp>
         <p:nvSpPr>
-          <p:cNvPr id="259" name="Google Shape;259;g95f015ef34_0_0"/>
+          <p:cNvPr id="258" name="Google Shape;258;g95f015ef34_0_0"/>
           <p:cNvSpPr/>
           <p:nvPr/>
         </p:nvSpPr>
         <p:spPr>
           <a:xfrm>
-            <a:off x="7045425" y="4397825"/>
-            <a:ext cx="1955100" cy="2364000"/>
+            <a:off x="7045425" y="3158475"/>
+            <a:ext cx="1955100" cy="3603300"/>
           </a:xfrm>
           <a:prstGeom prst="rect">
             <a:avLst/>
@@ -19839,31 +19744,83 @@
           </a:p>
         </p:txBody>
       </p:sp>
+      <p:pic>
+        <p:nvPicPr>
+          <p:cNvPr id="259" name="Google Shape;259;g95f015ef34_0_0"/>
+          <p:cNvPicPr preferRelativeResize="0"/>
+          <p:nvPr/>
+        </p:nvPicPr>
+        <p:blipFill>
+          <a:blip r:embed="rId17">
+            <a:alphaModFix/>
+          </a:blip>
+          <a:stretch>
+            <a:fillRect/>
+          </a:stretch>
+        </p:blipFill>
+        <p:spPr>
+          <a:xfrm>
+            <a:off x="11263893" y="2778969"/>
+            <a:ext cx="379500" cy="379500"/>
+          </a:xfrm>
+          <a:prstGeom prst="rect">
+            <a:avLst/>
+          </a:prstGeom>
+          <a:noFill/>
+          <a:ln>
+            <a:noFill/>
+          </a:ln>
+        </p:spPr>
+      </p:pic>
+      <p:pic>
+        <p:nvPicPr>
+          <p:cNvPr id="260" name="Google Shape;260;g95f015ef34_0_0"/>
+          <p:cNvPicPr preferRelativeResize="0"/>
+          <p:nvPr/>
+        </p:nvPicPr>
+        <p:blipFill>
+          <a:blip r:embed="rId17">
+            <a:alphaModFix/>
+          </a:blip>
+          <a:stretch>
+            <a:fillRect/>
+          </a:stretch>
+        </p:blipFill>
+        <p:spPr>
+          <a:xfrm>
+            <a:off x="11261450" y="5820764"/>
+            <a:ext cx="379500" cy="379500"/>
+          </a:xfrm>
+          <a:prstGeom prst="rect">
+            <a:avLst/>
+          </a:prstGeom>
+          <a:noFill/>
+          <a:ln>
+            <a:noFill/>
+          </a:ln>
+        </p:spPr>
+      </p:pic>
       <p:sp>
         <p:nvSpPr>
-          <p:cNvPr id="260" name="Google Shape;260;g95f015ef34_0_0"/>
-          <p:cNvSpPr/>
+          <p:cNvPr id="261" name="Google Shape;261;g95f015ef34_0_0"/>
+          <p:cNvSpPr txBox="1"/>
           <p:nvPr/>
         </p:nvSpPr>
         <p:spPr>
           <a:xfrm>
-            <a:off x="7117125" y="1059775"/>
-            <a:ext cx="1883400" cy="1980900"/>
+            <a:off x="9706450" y="1805874"/>
+            <a:ext cx="1883400" cy="896700"/>
           </a:xfrm>
           <a:prstGeom prst="rect">
             <a:avLst/>
           </a:prstGeom>
-          <a:solidFill>
-            <a:srgbClr val="EFEFEF">
-              <a:alpha val="61450"/>
-            </a:srgbClr>
-          </a:solidFill>
+          <a:noFill/>
           <a:ln>
             <a:noFill/>
           </a:ln>
         </p:spPr>
         <p:txBody>
-          <a:bodyPr anchorCtr="0" anchor="ctr" bIns="91425" lIns="91425" spcFirstLastPara="1" rIns="91425" wrap="square" tIns="91425">
+          <a:bodyPr anchorCtr="0" anchor="t" bIns="0" lIns="0" spcFirstLastPara="1" rIns="0" wrap="square" tIns="0">
             <a:noAutofit/>
           </a:bodyPr>
           <a:lstStyle/>
@@ -19878,12 +19835,259 @@
               <a:buNone/>
             </a:pPr>
             <a:r>
-              <a:t/>
+              <a:rPr b="1" lang="en-US" sz="1100">
+                <a:latin typeface="Courier New"/>
+                <a:ea typeface="Courier New"/>
+                <a:cs typeface="Courier New"/>
+                <a:sym typeface="Courier New"/>
+              </a:rPr>
+              <a:t>- reload_model()</a:t>
             </a:r>
-            <a:endParaRPr/>
+            <a:endParaRPr b="1" sz="1100">
+              <a:latin typeface="Courier New"/>
+              <a:ea typeface="Courier New"/>
+              <a:cs typeface="Courier New"/>
+              <a:sym typeface="Courier New"/>
+            </a:endParaRPr>
+          </a:p>
+          <a:p>
+            <a:pPr indent="0" lvl="0" marL="0" rtl="0" algn="l">
+              <a:spcBef>
+                <a:spcPts val="0"/>
+              </a:spcBef>
+              <a:spcAft>
+                <a:spcPts val="0"/>
+              </a:spcAft>
+              <a:buNone/>
+            </a:pPr>
+            <a:r>
+              <a:rPr b="1" lang="en-US" sz="1100">
+                <a:latin typeface="Courier New"/>
+                <a:ea typeface="Courier New"/>
+                <a:cs typeface="Courier New"/>
+                <a:sym typeface="Courier New"/>
+              </a:rPr>
+              <a:t>- test_parameters()</a:t>
+            </a:r>
+            <a:endParaRPr b="1" sz="1100">
+              <a:latin typeface="Courier New"/>
+              <a:ea typeface="Courier New"/>
+              <a:cs typeface="Courier New"/>
+              <a:sym typeface="Courier New"/>
+            </a:endParaRPr>
+          </a:p>
+          <a:p>
+            <a:pPr indent="0" lvl="0" marL="0" rtl="0" algn="l">
+              <a:spcBef>
+                <a:spcPts val="0"/>
+              </a:spcBef>
+              <a:spcAft>
+                <a:spcPts val="0"/>
+              </a:spcAft>
+              <a:buNone/>
+            </a:pPr>
+            <a:r>
+              <a:rPr b="1" lang="en-US" sz="1100">
+                <a:latin typeface="Courier New"/>
+                <a:ea typeface="Courier New"/>
+                <a:cs typeface="Courier New"/>
+                <a:sym typeface="Courier New"/>
+              </a:rPr>
+              <a:t>- predict()</a:t>
+            </a:r>
+            <a:endParaRPr b="1" sz="1100">
+              <a:latin typeface="Courier New"/>
+              <a:ea typeface="Courier New"/>
+              <a:cs typeface="Courier New"/>
+              <a:sym typeface="Courier New"/>
+            </a:endParaRPr>
           </a:p>
         </p:txBody>
       </p:sp>
+      <p:pic>
+        <p:nvPicPr>
+          <p:cNvPr id="262" name="Google Shape;262;g95f015ef34_0_0"/>
+          <p:cNvPicPr preferRelativeResize="0"/>
+          <p:nvPr/>
+        </p:nvPicPr>
+        <p:blipFill>
+          <a:blip r:embed="rId18">
+            <a:alphaModFix/>
+          </a:blip>
+          <a:stretch>
+            <a:fillRect/>
+          </a:stretch>
+        </p:blipFill>
+        <p:spPr>
+          <a:xfrm>
+            <a:off x="9686263" y="2770742"/>
+            <a:ext cx="379500" cy="341558"/>
+          </a:xfrm>
+          <a:prstGeom prst="rect">
+            <a:avLst/>
+          </a:prstGeom>
+          <a:noFill/>
+          <a:ln>
+            <a:noFill/>
+          </a:ln>
+        </p:spPr>
+      </p:pic>
+      <p:sp>
+        <p:nvSpPr>
+          <p:cNvPr id="263" name="Google Shape;263;g95f015ef34_0_0"/>
+          <p:cNvSpPr txBox="1"/>
+          <p:nvPr/>
+        </p:nvSpPr>
+        <p:spPr>
+          <a:xfrm>
+            <a:off x="8738175" y="1509714"/>
+            <a:ext cx="954000" cy="307800"/>
+          </a:xfrm>
+          <a:prstGeom prst="rect">
+            <a:avLst/>
+          </a:prstGeom>
+          <a:noFill/>
+          <a:ln>
+            <a:noFill/>
+          </a:ln>
+        </p:spPr>
+        <p:txBody>
+          <a:bodyPr anchorCtr="0" anchor="t" bIns="91425" lIns="91425" spcFirstLastPara="1" rIns="91425" wrap="square" tIns="91425">
+            <a:noAutofit/>
+          </a:bodyPr>
+          <a:lstStyle/>
+          <a:p>
+            <a:pPr indent="0" lvl="0" marL="0" rtl="0" algn="l">
+              <a:spcBef>
+                <a:spcPts val="0"/>
+              </a:spcBef>
+              <a:spcAft>
+                <a:spcPts val="0"/>
+              </a:spcAft>
+              <a:buNone/>
+            </a:pPr>
+            <a:r>
+              <a:rPr b="1" lang="en-US" sz="800">
+                <a:solidFill>
+                  <a:schemeClr val="dk1"/>
+                </a:solidFill>
+                <a:latin typeface="Courier New"/>
+                <a:ea typeface="Courier New"/>
+                <a:cs typeface="Courier New"/>
+                <a:sym typeface="Courier New"/>
+              </a:rPr>
+              <a:t>reload_model</a:t>
+            </a:r>
+            <a:endParaRPr sz="800"/>
+          </a:p>
+        </p:txBody>
+      </p:sp>
+      <p:pic>
+        <p:nvPicPr>
+          <p:cNvPr id="264" name="Google Shape;264;g95f015ef34_0_0"/>
+          <p:cNvPicPr preferRelativeResize="0"/>
+          <p:nvPr/>
+        </p:nvPicPr>
+        <p:blipFill>
+          <a:blip r:embed="rId18">
+            <a:alphaModFix/>
+          </a:blip>
+          <a:stretch>
+            <a:fillRect/>
+          </a:stretch>
+        </p:blipFill>
+        <p:spPr>
+          <a:xfrm>
+            <a:off x="9686970" y="5820622"/>
+            <a:ext cx="379500" cy="341558"/>
+          </a:xfrm>
+          <a:prstGeom prst="rect">
+            <a:avLst/>
+          </a:prstGeom>
+          <a:noFill/>
+          <a:ln>
+            <a:noFill/>
+          </a:ln>
+        </p:spPr>
+      </p:pic>
+      <p:sp>
+        <p:nvSpPr>
+          <p:cNvPr id="265" name="Google Shape;265;g95f015ef34_0_0"/>
+          <p:cNvSpPr txBox="1"/>
+          <p:nvPr/>
+        </p:nvSpPr>
+        <p:spPr>
+          <a:xfrm>
+            <a:off x="10655800" y="3452414"/>
+            <a:ext cx="954000" cy="307800"/>
+          </a:xfrm>
+          <a:prstGeom prst="rect">
+            <a:avLst/>
+          </a:prstGeom>
+          <a:noFill/>
+          <a:ln>
+            <a:noFill/>
+          </a:ln>
+        </p:spPr>
+        <p:txBody>
+          <a:bodyPr anchorCtr="0" anchor="t" bIns="91425" lIns="91425" spcFirstLastPara="1" rIns="91425" wrap="square" tIns="91425">
+            <a:noAutofit/>
+          </a:bodyPr>
+          <a:lstStyle/>
+          <a:p>
+            <a:pPr indent="0" lvl="0" marL="0" rtl="0" algn="l">
+              <a:spcBef>
+                <a:spcPts val="0"/>
+              </a:spcBef>
+              <a:spcAft>
+                <a:spcPts val="0"/>
+              </a:spcAft>
+              <a:buNone/>
+            </a:pPr>
+            <a:r>
+              <a:rPr b="1" lang="en-US" sz="800">
+                <a:solidFill>
+                  <a:schemeClr val="dk1"/>
+                </a:solidFill>
+                <a:latin typeface="Courier New"/>
+                <a:ea typeface="Courier New"/>
+                <a:cs typeface="Courier New"/>
+                <a:sym typeface="Courier New"/>
+              </a:rPr>
+              <a:t>predict</a:t>
+            </a:r>
+            <a:endParaRPr sz="800"/>
+          </a:p>
+        </p:txBody>
+      </p:sp>
+      <p:pic>
+        <p:nvPicPr>
+          <p:cNvPr id="266" name="Google Shape;266;g95f015ef34_0_0"/>
+          <p:cNvPicPr preferRelativeResize="0"/>
+          <p:nvPr/>
+        </p:nvPicPr>
+        <p:blipFill>
+          <a:blip r:embed="rId16">
+            <a:alphaModFix/>
+          </a:blip>
+          <a:stretch>
+            <a:fillRect/>
+          </a:stretch>
+        </p:blipFill>
+        <p:spPr>
+          <a:xfrm>
+            <a:off x="10390802" y="5853463"/>
+            <a:ext cx="546300" cy="305576"/>
+          </a:xfrm>
+          <a:prstGeom prst="rect">
+            <a:avLst/>
+          </a:prstGeom>
+          <a:noFill/>
+          <a:ln>
+            <a:noFill/>
+          </a:ln>
+        </p:spPr>
+      </p:pic>
     </p:spTree>
   </p:cSld>
   <p:clrMapOvr>

</xml_diff>